<commit_message>
fertige oder fast fertige präsi
</commit_message>
<xml_diff>
--- a/GlobalSeminarUSA/vortrag/final/final_presentation.pptx
+++ b/GlobalSeminarUSA/vortrag/final/final_presentation.pptx
@@ -5,24 +5,32 @@
     <p:sldMasterId id="2147483648" r:id="rId1"/>
   </p:sldMasterIdLst>
   <p:notesMasterIdLst>
-    <p:notesMasterId r:id="rId14"/>
+    <p:notesMasterId r:id="rId22"/>
   </p:notesMasterIdLst>
   <p:handoutMasterIdLst>
-    <p:handoutMasterId r:id="rId15"/>
+    <p:handoutMasterId r:id="rId23"/>
   </p:handoutMasterIdLst>
   <p:sldIdLst>
     <p:sldId id="256" r:id="rId2"/>
     <p:sldId id="257" r:id="rId3"/>
-    <p:sldId id="267" r:id="rId4"/>
-    <p:sldId id="268" r:id="rId5"/>
-    <p:sldId id="265" r:id="rId6"/>
+    <p:sldId id="268" r:id="rId4"/>
+    <p:sldId id="265" r:id="rId5"/>
+    <p:sldId id="270" r:id="rId6"/>
     <p:sldId id="263" r:id="rId7"/>
-    <p:sldId id="264" r:id="rId8"/>
-    <p:sldId id="258" r:id="rId9"/>
-    <p:sldId id="259" r:id="rId10"/>
-    <p:sldId id="260" r:id="rId11"/>
-    <p:sldId id="266" r:id="rId12"/>
-    <p:sldId id="262" r:id="rId13"/>
+    <p:sldId id="275" r:id="rId8"/>
+    <p:sldId id="264" r:id="rId9"/>
+    <p:sldId id="276" r:id="rId10"/>
+    <p:sldId id="271" r:id="rId11"/>
+    <p:sldId id="277" r:id="rId12"/>
+    <p:sldId id="272" r:id="rId13"/>
+    <p:sldId id="278" r:id="rId14"/>
+    <p:sldId id="273" r:id="rId15"/>
+    <p:sldId id="258" r:id="rId16"/>
+    <p:sldId id="259" r:id="rId17"/>
+    <p:sldId id="260" r:id="rId18"/>
+    <p:sldId id="269" r:id="rId19"/>
+    <p:sldId id="266" r:id="rId20"/>
+    <p:sldId id="262" r:id="rId21"/>
   </p:sldIdLst>
   <p:sldSz cx="9144000" cy="6858000" type="screen4x3"/>
   <p:notesSz cx="6858000" cy="9144000"/>
@@ -3988,11 +3996,11 @@
           <a:p>
             <a:r>
               <a:rPr lang="de-DE" dirty="0" smtClean="0"/>
-              <a:t>Data </a:t>
+              <a:t>Piano roll </a:t>
             </a:r>
             <a:r>
               <a:rPr lang="de-DE" dirty="0" err="1" smtClean="0"/>
-              <a:t>processing</a:t>
+              <a:t>scanner</a:t>
             </a:r>
             <a:endParaRPr lang="de-DE" dirty="0"/>
           </a:p>
@@ -4000,25 +4008,6 @@
       </p:sp>
       <p:sp>
         <p:nvSpPr>
-          <p:cNvPr id="3" name="Inhaltsplatzhalter 2"/>
-          <p:cNvSpPr>
-            <a:spLocks noGrp="1"/>
-          </p:cNvSpPr>
-          <p:nvPr>
-            <p:ph idx="1"/>
-          </p:nvPr>
-        </p:nvSpPr>
-        <p:spPr/>
-        <p:txBody>
-          <a:bodyPr/>
-          <a:lstStyle/>
-          <a:p>
-            <a:endParaRPr lang="de-DE"/>
-          </a:p>
-        </p:txBody>
-      </p:sp>
-      <p:sp>
-        <p:nvSpPr>
           <p:cNvPr id="4" name="Datumsplatzhalter 3"/>
           <p:cNvSpPr>
             <a:spLocks noGrp="1"/>
@@ -4034,7 +4023,7 @@
           <a:p>
             <a:fld id="{048220EE-0B5D-1D4F-A698-CD85F79D8F31}" type="datetime1">
               <a:rPr lang="de-CH" smtClean="0"/>
-              <a:t>19.07.12</a:t>
+              <a:t>20.07.12</a:t>
             </a:fld>
             <a:endParaRPr lang="de-DE"/>
           </a:p>
@@ -4088,7 +4077,7 @@
       </p:sp>
       <p:pic>
         <p:nvPicPr>
-          <p:cNvPr id="7" name="Bild 6" descr="pattern_recognition.bmp"/>
+          <p:cNvPr id="7" name="Bild 6" descr="arrestor.png"/>
           <p:cNvPicPr>
             <a:picLocks noChangeAspect="1"/>
           </p:cNvPicPr>
@@ -4108,8 +4097,8 @@
         </p:blipFill>
         <p:spPr>
           <a:xfrm>
-            <a:off x="457200" y="1985773"/>
-            <a:ext cx="8294542" cy="3673296"/>
+            <a:off x="1311768" y="1964703"/>
+            <a:ext cx="6994933" cy="4161460"/>
           </a:xfrm>
           <a:prstGeom prst="rect">
             <a:avLst/>
@@ -4119,7 +4108,7 @@
     </p:spTree>
     <p:extLst>
       <p:ext uri="{BB962C8B-B14F-4D97-AF65-F5344CB8AC3E}">
-        <p14:creationId xmlns:p14="http://schemas.microsoft.com/office/powerpoint/2010/main" val="3646141842"/>
+        <p14:creationId xmlns:p14="http://schemas.microsoft.com/office/powerpoint/2010/main" val="1246672214"/>
       </p:ext>
     </p:extLst>
   </p:cSld>
@@ -4170,11 +4159,11 @@
           <a:p>
             <a:r>
               <a:rPr lang="de-DE" dirty="0" smtClean="0"/>
-              <a:t>Further </a:t>
+              <a:t>Piano roll </a:t>
             </a:r>
             <a:r>
               <a:rPr lang="de-DE" dirty="0" err="1" smtClean="0"/>
-              <a:t>works</a:t>
+              <a:t>scanner</a:t>
             </a:r>
             <a:endParaRPr lang="de-DE" dirty="0"/>
           </a:p>
@@ -4182,69 +4171,6 @@
       </p:sp>
       <p:sp>
         <p:nvSpPr>
-          <p:cNvPr id="3" name="Inhaltsplatzhalter 2"/>
-          <p:cNvSpPr>
-            <a:spLocks noGrp="1"/>
-          </p:cNvSpPr>
-          <p:nvPr>
-            <p:ph idx="1"/>
-          </p:nvPr>
-        </p:nvSpPr>
-        <p:spPr/>
-        <p:txBody>
-          <a:bodyPr/>
-          <a:lstStyle/>
-          <a:p>
-            <a:r>
-              <a:rPr lang="de-DE" dirty="0" err="1" smtClean="0"/>
-              <a:t>Smaller</a:t>
-            </a:r>
-            <a:endParaRPr lang="de-DE" dirty="0" smtClean="0"/>
-          </a:p>
-          <a:p>
-            <a:r>
-              <a:rPr lang="de-DE" dirty="0" err="1" smtClean="0"/>
-              <a:t>Better</a:t>
-            </a:r>
-            <a:r>
-              <a:rPr lang="de-DE" dirty="0" smtClean="0"/>
-              <a:t> </a:t>
-            </a:r>
-            <a:r>
-              <a:rPr lang="de-DE" dirty="0" err="1" smtClean="0"/>
-              <a:t>speed</a:t>
-            </a:r>
-            <a:r>
-              <a:rPr lang="de-DE" dirty="0" smtClean="0"/>
-              <a:t> </a:t>
-            </a:r>
-            <a:r>
-              <a:rPr lang="de-DE" dirty="0" err="1" smtClean="0"/>
-              <a:t>recognition</a:t>
-            </a:r>
-            <a:endParaRPr lang="de-DE" dirty="0" smtClean="0"/>
-          </a:p>
-          <a:p>
-            <a:r>
-              <a:rPr lang="de-DE" dirty="0" smtClean="0"/>
-              <a:t>MIDI </a:t>
-            </a:r>
-            <a:r>
-              <a:rPr lang="de-DE" dirty="0" err="1" smtClean="0"/>
-              <a:t>output</a:t>
-            </a:r>
-            <a:endParaRPr lang="de-DE" smtClean="0"/>
-          </a:p>
-          <a:p>
-            <a:endParaRPr lang="de-DE" smtClean="0"/>
-          </a:p>
-          <a:p>
-            <a:endParaRPr lang="de-DE" dirty="0"/>
-          </a:p>
-        </p:txBody>
-      </p:sp>
-      <p:sp>
-        <p:nvSpPr>
           <p:cNvPr id="4" name="Datumsplatzhalter 3"/>
           <p:cNvSpPr>
             <a:spLocks noGrp="1"/>
@@ -4260,7 +4186,7 @@
           <a:p>
             <a:fld id="{048220EE-0B5D-1D4F-A698-CD85F79D8F31}" type="datetime1">
               <a:rPr lang="de-CH" smtClean="0"/>
-              <a:t>19.07.12</a:t>
+              <a:t>20.07.12</a:t>
             </a:fld>
             <a:endParaRPr lang="de-DE"/>
           </a:p>
@@ -4312,16 +4238,48 @@
           </a:p>
         </p:txBody>
       </p:sp>
+      <p:pic>
+        <p:nvPicPr>
+          <p:cNvPr id="9" name="Inhaltsplatzhalter 8" descr="scanner fertig-36pt.png"/>
+          <p:cNvPicPr>
+            <a:picLocks noGrp="1" noChangeAspect="1"/>
+          </p:cNvPicPr>
+          <p:nvPr>
+            <p:ph idx="1"/>
+          </p:nvPr>
+        </p:nvPicPr>
+        <p:blipFill>
+          <a:blip r:embed="rId2">
+            <a:extLst>
+              <a:ext uri="{28A0092B-C50C-407E-A947-70E740481C1C}">
+                <a14:useLocalDpi xmlns:a14="http://schemas.microsoft.com/office/drawing/2010/main" val="0"/>
+              </a:ext>
+            </a:extLst>
+          </a:blip>
+          <a:srcRect t="3670" b="3670"/>
+          <a:stretch>
+            <a:fillRect/>
+          </a:stretch>
+        </p:blipFill>
+        <p:spPr/>
+      </p:pic>
     </p:spTree>
     <p:extLst>
       <p:ext uri="{BB962C8B-B14F-4D97-AF65-F5344CB8AC3E}">
-        <p14:creationId xmlns:p14="http://schemas.microsoft.com/office/powerpoint/2010/main" val="1481005516"/>
+        <p14:creationId xmlns:p14="http://schemas.microsoft.com/office/powerpoint/2010/main" val="3675649034"/>
       </p:ext>
     </p:extLst>
   </p:cSld>
   <p:clrMapOvr>
     <a:masterClrMapping/>
   </p:clrMapOvr>
+  <p:timing>
+    <p:tnLst>
+      <p:par>
+        <p:cTn xmlns:p14="http://schemas.microsoft.com/office/powerpoint/2010/main" id="1" dur="indefinite" restart="never" nodeType="tmRoot"/>
+      </p:par>
+    </p:tnLst>
+  </p:timing>
 </p:sld>
 </file>
 
@@ -4358,20 +4316,12 @@
           <a:lstStyle/>
           <a:p>
             <a:r>
+              <a:rPr lang="de-DE" dirty="0" smtClean="0"/>
+              <a:t>Piano roll </a:t>
+            </a:r>
+            <a:r>
               <a:rPr lang="de-DE" dirty="0" err="1" smtClean="0"/>
-              <a:t>Thank</a:t>
-            </a:r>
-            <a:r>
-              <a:rPr lang="de-DE" dirty="0" smtClean="0"/>
-              <a:t> </a:t>
-            </a:r>
-            <a:r>
-              <a:rPr lang="de-DE" dirty="0" err="1" smtClean="0"/>
-              <a:t>you</a:t>
-            </a:r>
-            <a:r>
-              <a:rPr lang="de-DE" dirty="0" smtClean="0"/>
-              <a:t>!</a:t>
+              <a:t>scanner</a:t>
             </a:r>
             <a:endParaRPr lang="de-DE" dirty="0"/>
           </a:p>
@@ -4379,41 +4329,6 @@
       </p:sp>
       <p:sp>
         <p:nvSpPr>
-          <p:cNvPr id="3" name="Inhaltsplatzhalter 2"/>
-          <p:cNvSpPr>
-            <a:spLocks noGrp="1"/>
-          </p:cNvSpPr>
-          <p:nvPr>
-            <p:ph idx="1"/>
-          </p:nvPr>
-        </p:nvSpPr>
-        <p:spPr/>
-        <p:txBody>
-          <a:bodyPr/>
-          <a:lstStyle/>
-          <a:p>
-            <a:r>
-              <a:rPr lang="de-DE" dirty="0" err="1" smtClean="0"/>
-              <a:t>Any</a:t>
-            </a:r>
-            <a:r>
-              <a:rPr lang="de-DE" dirty="0" smtClean="0"/>
-              <a:t> </a:t>
-            </a:r>
-            <a:r>
-              <a:rPr lang="de-DE" dirty="0" err="1" smtClean="0"/>
-              <a:t>questions</a:t>
-            </a:r>
-            <a:r>
-              <a:rPr lang="de-DE" dirty="0" smtClean="0"/>
-              <a:t>?</a:t>
-            </a:r>
-            <a:endParaRPr lang="de-DE" dirty="0"/>
-          </a:p>
-        </p:txBody>
-      </p:sp>
-      <p:sp>
-        <p:nvSpPr>
           <p:cNvPr id="4" name="Datumsplatzhalter 3"/>
           <p:cNvSpPr>
             <a:spLocks noGrp="1"/>
@@ -4429,7 +4344,7 @@
           <a:p>
             <a:fld id="{048220EE-0B5D-1D4F-A698-CD85F79D8F31}" type="datetime1">
               <a:rPr lang="de-CH" smtClean="0"/>
-              <a:t>19.07.12</a:t>
+              <a:t>20.07.12</a:t>
             </a:fld>
             <a:endParaRPr lang="de-DE"/>
           </a:p>
@@ -4481,10 +4396,40 @@
           </a:p>
         </p:txBody>
       </p:sp>
+      <p:pic>
+        <p:nvPicPr>
+          <p:cNvPr id="7" name="Bild 6" descr="cover.png"/>
+          <p:cNvPicPr>
+            <a:picLocks noChangeAspect="1"/>
+          </p:cNvPicPr>
+          <p:nvPr/>
+        </p:nvPicPr>
+        <p:blipFill>
+          <a:blip r:embed="rId2">
+            <a:extLst>
+              <a:ext uri="{28A0092B-C50C-407E-A947-70E740481C1C}">
+                <a14:useLocalDpi xmlns:a14="http://schemas.microsoft.com/office/drawing/2010/main" val="0"/>
+              </a:ext>
+            </a:extLst>
+          </a:blip>
+          <a:stretch>
+            <a:fillRect/>
+          </a:stretch>
+        </p:blipFill>
+        <p:spPr>
+          <a:xfrm>
+            <a:off x="2693311" y="1348041"/>
+            <a:ext cx="3963214" cy="5008309"/>
+          </a:xfrm>
+          <a:prstGeom prst="rect">
+            <a:avLst/>
+          </a:prstGeom>
+        </p:spPr>
+      </p:pic>
     </p:spTree>
     <p:extLst>
       <p:ext uri="{BB962C8B-B14F-4D97-AF65-F5344CB8AC3E}">
-        <p14:creationId xmlns:p14="http://schemas.microsoft.com/office/powerpoint/2010/main" val="1243045272"/>
+        <p14:creationId xmlns:p14="http://schemas.microsoft.com/office/powerpoint/2010/main" val="1378330307"/>
       </p:ext>
     </p:extLst>
   </p:cSld>
@@ -4501,7 +4446,7 @@
 </p:sld>
 </file>
 
-<file path=ppt/slides/slide2.xml><?xml version="1.0" encoding="utf-8"?>
+<file path=ppt/slides/slide13.xml><?xml version="1.0" encoding="utf-8"?>
 <p:sld xmlns:a="http://schemas.openxmlformats.org/drawingml/2006/main" xmlns:r="http://schemas.openxmlformats.org/officeDocument/2006/relationships" xmlns:p="http://schemas.openxmlformats.org/presentationml/2006/main">
   <p:cSld>
     <p:spTree>
@@ -4535,96 +4480,12 @@
           <a:p>
             <a:r>
               <a:rPr lang="de-DE" dirty="0" smtClean="0"/>
-              <a:t>Content</a:t>
-            </a:r>
-            <a:endParaRPr lang="de-DE" dirty="0"/>
-          </a:p>
-        </p:txBody>
-      </p:sp>
-      <p:sp>
-        <p:nvSpPr>
-          <p:cNvPr id="3" name="Inhaltsplatzhalter 2"/>
-          <p:cNvSpPr>
-            <a:spLocks noGrp="1"/>
-          </p:cNvSpPr>
-          <p:nvPr>
-            <p:ph idx="1"/>
-          </p:nvPr>
-        </p:nvSpPr>
-        <p:spPr/>
-        <p:txBody>
-          <a:bodyPr/>
-          <a:lstStyle/>
-          <a:p>
-            <a:r>
-              <a:rPr lang="de-DE" dirty="0" err="1" smtClean="0"/>
-              <a:t>Introduction</a:t>
-            </a:r>
-            <a:endParaRPr lang="de-DE" dirty="0" smtClean="0"/>
-          </a:p>
-          <a:p>
-            <a:r>
-              <a:rPr lang="de-DE" dirty="0" smtClean="0"/>
-              <a:t>Problem </a:t>
-            </a:r>
-            <a:r>
-              <a:rPr lang="de-DE" dirty="0" err="1" smtClean="0"/>
-              <a:t>description</a:t>
-            </a:r>
-            <a:endParaRPr lang="de-DE" dirty="0" smtClean="0"/>
-          </a:p>
-          <a:p>
-            <a:r>
-              <a:rPr lang="de-DE" dirty="0" smtClean="0"/>
               <a:t>Piano roll </a:t>
             </a:r>
             <a:r>
               <a:rPr lang="de-DE" dirty="0" err="1" smtClean="0"/>
               <a:t>scanner</a:t>
             </a:r>
-            <a:r>
-              <a:rPr lang="de-DE" dirty="0" smtClean="0"/>
-              <a:t> </a:t>
-            </a:r>
-          </a:p>
-          <a:p>
-            <a:r>
-              <a:rPr lang="de-DE" dirty="0" smtClean="0"/>
-              <a:t>Scanner </a:t>
-            </a:r>
-            <a:r>
-              <a:rPr lang="de-DE" dirty="0" err="1" smtClean="0"/>
-              <a:t>module</a:t>
-            </a:r>
-            <a:endParaRPr lang="de-DE" dirty="0" smtClean="0"/>
-          </a:p>
-          <a:p>
-            <a:r>
-              <a:rPr lang="de-DE" dirty="0" smtClean="0"/>
-              <a:t>Data </a:t>
-            </a:r>
-            <a:r>
-              <a:rPr lang="de-DE" dirty="0" err="1" smtClean="0"/>
-              <a:t>processing</a:t>
-            </a:r>
-            <a:endParaRPr lang="de-DE" dirty="0" smtClean="0"/>
-          </a:p>
-          <a:p>
-            <a:r>
-              <a:rPr lang="de-DE" dirty="0" smtClean="0"/>
-              <a:t>Further </a:t>
-            </a:r>
-            <a:r>
-              <a:rPr lang="de-DE" dirty="0" err="1" smtClean="0"/>
-              <a:t>works</a:t>
-            </a:r>
-            <a:endParaRPr lang="de-DE" dirty="0" smtClean="0"/>
-          </a:p>
-          <a:p>
-            <a:r>
-              <a:rPr lang="de-DE" dirty="0" err="1" smtClean="0"/>
-              <a:t>Questions</a:t>
-            </a:r>
             <a:endParaRPr lang="de-DE" dirty="0"/>
           </a:p>
         </p:txBody>
@@ -4646,7 +4507,7 @@
           <a:p>
             <a:fld id="{048220EE-0B5D-1D4F-A698-CD85F79D8F31}" type="datetime1">
               <a:rPr lang="de-CH" smtClean="0"/>
-              <a:t>19.07.12</a:t>
+              <a:t>20.07.12</a:t>
             </a:fld>
             <a:endParaRPr lang="de-DE"/>
           </a:p>
@@ -4692,16 +4553,41 @@
           <a:p>
             <a:fld id="{54C3B571-D783-E845-AA51-C7B99A40CE52}" type="slidenum">
               <a:rPr lang="de-DE" smtClean="0"/>
-              <a:t>2</a:t>
+              <a:t>13</a:t>
             </a:fld>
             <a:endParaRPr lang="de-DE"/>
           </a:p>
         </p:txBody>
       </p:sp>
+      <p:pic>
+        <p:nvPicPr>
+          <p:cNvPr id="9" name="Inhaltsplatzhalter 8" descr="scanner fertig-36pt.png"/>
+          <p:cNvPicPr>
+            <a:picLocks noGrp="1" noChangeAspect="1"/>
+          </p:cNvPicPr>
+          <p:nvPr>
+            <p:ph idx="1"/>
+          </p:nvPr>
+        </p:nvPicPr>
+        <p:blipFill>
+          <a:blip r:embed="rId2">
+            <a:extLst>
+              <a:ext uri="{28A0092B-C50C-407E-A947-70E740481C1C}">
+                <a14:useLocalDpi xmlns:a14="http://schemas.microsoft.com/office/drawing/2010/main" val="0"/>
+              </a:ext>
+            </a:extLst>
+          </a:blip>
+          <a:srcRect t="3670" b="3670"/>
+          <a:stretch>
+            <a:fillRect/>
+          </a:stretch>
+        </p:blipFill>
+        <p:spPr/>
+      </p:pic>
     </p:spTree>
     <p:extLst>
       <p:ext uri="{BB962C8B-B14F-4D97-AF65-F5344CB8AC3E}">
-        <p14:creationId xmlns:p14="http://schemas.microsoft.com/office/powerpoint/2010/main" val="1123233064"/>
+        <p14:creationId xmlns:p14="http://schemas.microsoft.com/office/powerpoint/2010/main" val="3675649034"/>
       </p:ext>
     </p:extLst>
   </p:cSld>
@@ -4718,7 +4604,7 @@
 </p:sld>
 </file>
 
-<file path=ppt/slides/slide3.xml><?xml version="1.0" encoding="utf-8"?>
+<file path=ppt/slides/slide14.xml><?xml version="1.0" encoding="utf-8"?>
 <p:sld xmlns:a="http://schemas.openxmlformats.org/drawingml/2006/main" xmlns:r="http://schemas.openxmlformats.org/officeDocument/2006/relationships" xmlns:p="http://schemas.openxmlformats.org/presentationml/2006/main">
   <p:cSld>
     <p:spTree>
@@ -4751,8 +4637,12 @@
           <a:lstStyle/>
           <a:p>
             <a:r>
+              <a:rPr lang="de-DE" dirty="0" smtClean="0"/>
+              <a:t>Piano roll </a:t>
+            </a:r>
+            <a:r>
               <a:rPr lang="de-DE" dirty="0" err="1" smtClean="0"/>
-              <a:t>Introduction</a:t>
+              <a:t>scanner</a:t>
             </a:r>
             <a:endParaRPr lang="de-DE" dirty="0"/>
           </a:p>
@@ -4760,76 +4650,6 @@
       </p:sp>
       <p:sp>
         <p:nvSpPr>
-          <p:cNvPr id="3" name="Inhaltsplatzhalter 2"/>
-          <p:cNvSpPr>
-            <a:spLocks noGrp="1"/>
-          </p:cNvSpPr>
-          <p:nvPr>
-            <p:ph idx="1"/>
-          </p:nvPr>
-        </p:nvSpPr>
-        <p:spPr/>
-        <p:txBody>
-          <a:bodyPr/>
-          <a:lstStyle/>
-          <a:p>
-            <a:r>
-              <a:rPr lang="de-DE" dirty="0" err="1" smtClean="0"/>
-              <a:t>Three</a:t>
-            </a:r>
-            <a:r>
-              <a:rPr lang="de-DE" dirty="0" smtClean="0"/>
-              <a:t> </a:t>
-            </a:r>
-            <a:r>
-              <a:rPr lang="de-DE" dirty="0" err="1" smtClean="0"/>
-              <a:t>main</a:t>
-            </a:r>
-            <a:r>
-              <a:rPr lang="de-DE" dirty="0" smtClean="0"/>
-              <a:t> </a:t>
-            </a:r>
-            <a:r>
-              <a:rPr lang="de-DE" dirty="0" err="1" smtClean="0"/>
-              <a:t>parts</a:t>
-            </a:r>
-            <a:endParaRPr lang="de-DE" dirty="0" smtClean="0"/>
-          </a:p>
-          <a:p>
-            <a:pPr lvl="1"/>
-            <a:r>
-              <a:rPr lang="de-DE" dirty="0" smtClean="0"/>
-              <a:t>Transport </a:t>
-            </a:r>
-            <a:r>
-              <a:rPr lang="de-DE" dirty="0" err="1" smtClean="0"/>
-              <a:t>system</a:t>
-            </a:r>
-            <a:endParaRPr lang="de-DE" dirty="0" smtClean="0"/>
-          </a:p>
-          <a:p>
-            <a:pPr lvl="1"/>
-            <a:r>
-              <a:rPr lang="de-DE" dirty="0" smtClean="0"/>
-              <a:t>Scanner</a:t>
-            </a:r>
-          </a:p>
-          <a:p>
-            <a:pPr lvl="1"/>
-            <a:r>
-              <a:rPr lang="de-DE" dirty="0" smtClean="0"/>
-              <a:t>Data </a:t>
-            </a:r>
-            <a:r>
-              <a:rPr lang="de-DE" dirty="0" err="1" smtClean="0"/>
-              <a:t>processing</a:t>
-            </a:r>
-            <a:endParaRPr lang="de-DE" dirty="0"/>
-          </a:p>
-        </p:txBody>
-      </p:sp>
-      <p:sp>
-        <p:nvSpPr>
           <p:cNvPr id="4" name="Datumsplatzhalter 3"/>
           <p:cNvSpPr>
             <a:spLocks noGrp="1"/>
@@ -4845,7 +4665,7 @@
           <a:p>
             <a:fld id="{048220EE-0B5D-1D4F-A698-CD85F79D8F31}" type="datetime1">
               <a:rPr lang="de-CH" smtClean="0"/>
-              <a:t>19.07.12</a:t>
+              <a:t>20.07.12</a:t>
             </a:fld>
             <a:endParaRPr lang="de-DE"/>
           </a:p>
@@ -4891,26 +4711,63 @@
           <a:p>
             <a:fld id="{54C3B571-D783-E845-AA51-C7B99A40CE52}" type="slidenum">
               <a:rPr lang="de-DE" smtClean="0"/>
-              <a:t>3</a:t>
+              <a:t>14</a:t>
             </a:fld>
             <a:endParaRPr lang="de-DE"/>
           </a:p>
         </p:txBody>
       </p:sp>
+      <p:pic>
+        <p:nvPicPr>
+          <p:cNvPr id="7" name="Bild 6" descr="roll holder complet.png"/>
+          <p:cNvPicPr>
+            <a:picLocks noChangeAspect="1"/>
+          </p:cNvPicPr>
+          <p:nvPr/>
+        </p:nvPicPr>
+        <p:blipFill>
+          <a:blip r:embed="rId2">
+            <a:extLst>
+              <a:ext uri="{28A0092B-C50C-407E-A947-70E740481C1C}">
+                <a14:useLocalDpi xmlns:a14="http://schemas.microsoft.com/office/drawing/2010/main" val="0"/>
+              </a:ext>
+            </a:extLst>
+          </a:blip>
+          <a:stretch>
+            <a:fillRect/>
+          </a:stretch>
+        </p:blipFill>
+        <p:spPr>
+          <a:xfrm>
+            <a:off x="1074534" y="1521287"/>
+            <a:ext cx="7064708" cy="4233327"/>
+          </a:xfrm>
+          <a:prstGeom prst="rect">
+            <a:avLst/>
+          </a:prstGeom>
+        </p:spPr>
+      </p:pic>
     </p:spTree>
     <p:extLst>
       <p:ext uri="{BB962C8B-B14F-4D97-AF65-F5344CB8AC3E}">
-        <p14:creationId xmlns:p14="http://schemas.microsoft.com/office/powerpoint/2010/main" val="3001512693"/>
+        <p14:creationId xmlns:p14="http://schemas.microsoft.com/office/powerpoint/2010/main" val="3932849707"/>
       </p:ext>
     </p:extLst>
   </p:cSld>
   <p:clrMapOvr>
     <a:masterClrMapping/>
   </p:clrMapOvr>
+  <p:timing>
+    <p:tnLst>
+      <p:par>
+        <p:cTn xmlns:p14="http://schemas.microsoft.com/office/powerpoint/2010/main" id="1" dur="indefinite" restart="never" nodeType="tmRoot"/>
+      </p:par>
+    </p:tnLst>
+  </p:timing>
 </p:sld>
 </file>
 
-<file path=ppt/slides/slide4.xml><?xml version="1.0" encoding="utf-8"?>
+<file path=ppt/slides/slide15.xml><?xml version="1.0" encoding="utf-8"?>
 <p:sld xmlns:a="http://schemas.openxmlformats.org/drawingml/2006/main" xmlns:r="http://schemas.openxmlformats.org/officeDocument/2006/relationships" xmlns:p="http://schemas.openxmlformats.org/presentationml/2006/main">
   <p:cSld>
     <p:spTree>
@@ -4944,42 +4801,8 @@
           <a:p>
             <a:r>
               <a:rPr lang="de-DE" dirty="0" smtClean="0"/>
-              <a:t>Problem </a:t>
-            </a:r>
-            <a:r>
-              <a:rPr lang="de-DE" dirty="0" err="1" smtClean="0"/>
-              <a:t>description</a:t>
-            </a:r>
-            <a:endParaRPr lang="de-DE" dirty="0"/>
-          </a:p>
-        </p:txBody>
-      </p:sp>
-      <p:sp>
-        <p:nvSpPr>
-          <p:cNvPr id="3" name="Inhaltsplatzhalter 2"/>
-          <p:cNvSpPr>
-            <a:spLocks noGrp="1"/>
-          </p:cNvSpPr>
-          <p:nvPr>
-            <p:ph idx="1"/>
-          </p:nvPr>
-        </p:nvSpPr>
-        <p:spPr/>
-        <p:txBody>
-          <a:bodyPr/>
-          <a:lstStyle/>
-          <a:p>
-            <a:r>
-              <a:rPr lang="de-DE" dirty="0" smtClean="0"/>
-              <a:t>Piano </a:t>
-            </a:r>
-            <a:r>
-              <a:rPr lang="de-DE" dirty="0" err="1" smtClean="0"/>
-              <a:t>player</a:t>
-            </a:r>
-            <a:endParaRPr lang="de-DE" dirty="0" smtClean="0"/>
-          </a:p>
-          <a:p>
+              <a:t>Scanner</a:t>
+            </a:r>
             <a:endParaRPr lang="de-DE" dirty="0"/>
           </a:p>
         </p:txBody>
@@ -5023,10 +4846,10 @@
           <a:lstStyle/>
           <a:p>
             <a:r>
-              <a:rPr lang="de-DE" smtClean="0"/>
+              <a:rPr lang="de-DE" dirty="0" smtClean="0"/>
               <a:t>Group 4</a:t>
             </a:r>
-            <a:endParaRPr lang="de-DE"/>
+            <a:endParaRPr lang="de-DE" dirty="0"/>
           </a:p>
         </p:txBody>
       </p:sp>
@@ -5047,572 +4870,7 @@
           <a:p>
             <a:fld id="{54C3B571-D783-E845-AA51-C7B99A40CE52}" type="slidenum">
               <a:rPr lang="de-DE" smtClean="0"/>
-              <a:t>4</a:t>
-            </a:fld>
-            <a:endParaRPr lang="de-DE"/>
-          </a:p>
-        </p:txBody>
-      </p:sp>
-    </p:spTree>
-    <p:extLst>
-      <p:ext uri="{BB962C8B-B14F-4D97-AF65-F5344CB8AC3E}">
-        <p14:creationId xmlns:p14="http://schemas.microsoft.com/office/powerpoint/2010/main" val="866056116"/>
-      </p:ext>
-    </p:extLst>
-  </p:cSld>
-  <p:clrMapOvr>
-    <a:masterClrMapping/>
-  </p:clrMapOvr>
-</p:sld>
-</file>
-
-<file path=ppt/slides/slide5.xml><?xml version="1.0" encoding="utf-8"?>
-<p:sld xmlns:a="http://schemas.openxmlformats.org/drawingml/2006/main" xmlns:r="http://schemas.openxmlformats.org/officeDocument/2006/relationships" xmlns:p="http://schemas.openxmlformats.org/presentationml/2006/main">
-  <p:cSld>
-    <p:spTree>
-      <p:nvGrpSpPr>
-        <p:cNvPr id="1" name=""/>
-        <p:cNvGrpSpPr/>
-        <p:nvPr/>
-      </p:nvGrpSpPr>
-      <p:grpSpPr>
-        <a:xfrm>
-          <a:off x="0" y="0"/>
-          <a:ext cx="0" cy="0"/>
-          <a:chOff x="0" y="0"/>
-          <a:chExt cx="0" cy="0"/>
-        </a:xfrm>
-      </p:grpSpPr>
-      <p:sp>
-        <p:nvSpPr>
-          <p:cNvPr id="2" name="Titel 1"/>
-          <p:cNvSpPr>
-            <a:spLocks noGrp="1"/>
-          </p:cNvSpPr>
-          <p:nvPr>
-            <p:ph type="title"/>
-          </p:nvPr>
-        </p:nvSpPr>
-        <p:spPr/>
-        <p:txBody>
-          <a:bodyPr/>
-          <a:lstStyle/>
-          <a:p>
-            <a:r>
-              <a:rPr lang="de-DE" dirty="0" smtClean="0"/>
-              <a:t>Piano roll </a:t>
-            </a:r>
-            <a:r>
-              <a:rPr lang="de-DE" dirty="0" err="1" smtClean="0"/>
-              <a:t>scanner</a:t>
-            </a:r>
-            <a:endParaRPr lang="de-DE" dirty="0"/>
-          </a:p>
-        </p:txBody>
-      </p:sp>
-      <p:pic>
-        <p:nvPicPr>
-          <p:cNvPr id="7" name="Inhaltsplatzhalter 6" descr="scanner fertig.png"/>
-          <p:cNvPicPr>
-            <a:picLocks noGrp="1" noChangeAspect="1"/>
-          </p:cNvPicPr>
-          <p:nvPr>
-            <p:ph idx="1"/>
-          </p:nvPr>
-        </p:nvPicPr>
-        <p:blipFill>
-          <a:blip r:embed="rId2">
-            <a:extLst>
-              <a:ext uri="{28A0092B-C50C-407E-A947-70E740481C1C}">
-                <a14:useLocalDpi xmlns:a14="http://schemas.microsoft.com/office/drawing/2010/main" val="0"/>
-              </a:ext>
-            </a:extLst>
-          </a:blip>
-          <a:srcRect l="1431" r="1431"/>
-          <a:stretch>
-            <a:fillRect/>
-          </a:stretch>
-        </p:blipFill>
-        <p:spPr/>
-      </p:pic>
-      <p:sp>
-        <p:nvSpPr>
-          <p:cNvPr id="4" name="Datumsplatzhalter 3"/>
-          <p:cNvSpPr>
-            <a:spLocks noGrp="1"/>
-          </p:cNvSpPr>
-          <p:nvPr>
-            <p:ph type="dt" sz="half" idx="10"/>
-          </p:nvPr>
-        </p:nvSpPr>
-        <p:spPr/>
-        <p:txBody>
-          <a:bodyPr/>
-          <a:lstStyle/>
-          <a:p>
-            <a:fld id="{048220EE-0B5D-1D4F-A698-CD85F79D8F31}" type="datetime1">
-              <a:rPr lang="de-CH" smtClean="0"/>
-              <a:t>19.07.12</a:t>
-            </a:fld>
-            <a:endParaRPr lang="de-DE"/>
-          </a:p>
-        </p:txBody>
-      </p:sp>
-      <p:sp>
-        <p:nvSpPr>
-          <p:cNvPr id="5" name="Fußzeilenplatzhalter 4"/>
-          <p:cNvSpPr>
-            <a:spLocks noGrp="1"/>
-          </p:cNvSpPr>
-          <p:nvPr>
-            <p:ph type="ftr" sz="quarter" idx="11"/>
-          </p:nvPr>
-        </p:nvSpPr>
-        <p:spPr/>
-        <p:txBody>
-          <a:bodyPr/>
-          <a:lstStyle/>
-          <a:p>
-            <a:r>
-              <a:rPr lang="de-DE" smtClean="0"/>
-              <a:t>Group 4</a:t>
-            </a:r>
-            <a:endParaRPr lang="de-DE"/>
-          </a:p>
-        </p:txBody>
-      </p:sp>
-      <p:sp>
-        <p:nvSpPr>
-          <p:cNvPr id="6" name="Foliennummernplatzhalter 5"/>
-          <p:cNvSpPr>
-            <a:spLocks noGrp="1"/>
-          </p:cNvSpPr>
-          <p:nvPr>
-            <p:ph type="sldNum" sz="quarter" idx="12"/>
-          </p:nvPr>
-        </p:nvSpPr>
-        <p:spPr/>
-        <p:txBody>
-          <a:bodyPr/>
-          <a:lstStyle/>
-          <a:p>
-            <a:fld id="{54C3B571-D783-E845-AA51-C7B99A40CE52}" type="slidenum">
-              <a:rPr lang="de-DE" smtClean="0"/>
-              <a:t>5</a:t>
-            </a:fld>
-            <a:endParaRPr lang="de-DE"/>
-          </a:p>
-        </p:txBody>
-      </p:sp>
-    </p:spTree>
-    <p:extLst>
-      <p:ext uri="{BB962C8B-B14F-4D97-AF65-F5344CB8AC3E}">
-        <p14:creationId xmlns:p14="http://schemas.microsoft.com/office/powerpoint/2010/main" val="3032409290"/>
-      </p:ext>
-    </p:extLst>
-  </p:cSld>
-  <p:clrMapOvr>
-    <a:masterClrMapping/>
-  </p:clrMapOvr>
-</p:sld>
-</file>
-
-<file path=ppt/slides/slide6.xml><?xml version="1.0" encoding="utf-8"?>
-<p:sld xmlns:a="http://schemas.openxmlformats.org/drawingml/2006/main" xmlns:r="http://schemas.openxmlformats.org/officeDocument/2006/relationships" xmlns:p="http://schemas.openxmlformats.org/presentationml/2006/main">
-  <p:cSld>
-    <p:spTree>
-      <p:nvGrpSpPr>
-        <p:cNvPr id="1" name=""/>
-        <p:cNvGrpSpPr/>
-        <p:nvPr/>
-      </p:nvGrpSpPr>
-      <p:grpSpPr>
-        <a:xfrm>
-          <a:off x="0" y="0"/>
-          <a:ext cx="0" cy="0"/>
-          <a:chOff x="0" y="0"/>
-          <a:chExt cx="0" cy="0"/>
-        </a:xfrm>
-      </p:grpSpPr>
-      <p:sp>
-        <p:nvSpPr>
-          <p:cNvPr id="2" name="Titel 1"/>
-          <p:cNvSpPr>
-            <a:spLocks noGrp="1"/>
-          </p:cNvSpPr>
-          <p:nvPr>
-            <p:ph type="title"/>
-          </p:nvPr>
-        </p:nvSpPr>
-        <p:spPr/>
-        <p:txBody>
-          <a:bodyPr>
-            <a:normAutofit/>
-          </a:bodyPr>
-          <a:lstStyle/>
-          <a:p>
-            <a:r>
-              <a:rPr lang="de-DE" dirty="0" smtClean="0"/>
-              <a:t>Piano roll </a:t>
-            </a:r>
-            <a:r>
-              <a:rPr lang="de-DE" dirty="0" err="1" smtClean="0"/>
-              <a:t>scanner</a:t>
-            </a:r>
-            <a:endParaRPr lang="de-DE" dirty="0"/>
-          </a:p>
-        </p:txBody>
-      </p:sp>
-      <p:sp>
-        <p:nvSpPr>
-          <p:cNvPr id="3" name="Inhaltsplatzhalter 2"/>
-          <p:cNvSpPr>
-            <a:spLocks noGrp="1"/>
-          </p:cNvSpPr>
-          <p:nvPr>
-            <p:ph idx="1"/>
-          </p:nvPr>
-        </p:nvSpPr>
-        <p:spPr/>
-        <p:txBody>
-          <a:bodyPr/>
-          <a:lstStyle/>
-          <a:p>
-            <a:endParaRPr lang="de-DE"/>
-          </a:p>
-        </p:txBody>
-      </p:sp>
-      <p:sp>
-        <p:nvSpPr>
-          <p:cNvPr id="4" name="Datumsplatzhalter 3"/>
-          <p:cNvSpPr>
-            <a:spLocks noGrp="1"/>
-          </p:cNvSpPr>
-          <p:nvPr>
-            <p:ph type="dt" sz="half" idx="10"/>
-          </p:nvPr>
-        </p:nvSpPr>
-        <p:spPr/>
-        <p:txBody>
-          <a:bodyPr/>
-          <a:lstStyle/>
-          <a:p>
-            <a:fld id="{048220EE-0B5D-1D4F-A698-CD85F79D8F31}" type="datetime1">
-              <a:rPr lang="de-CH" smtClean="0"/>
-              <a:t>19.07.12</a:t>
-            </a:fld>
-            <a:endParaRPr lang="de-DE"/>
-          </a:p>
-        </p:txBody>
-      </p:sp>
-      <p:sp>
-        <p:nvSpPr>
-          <p:cNvPr id="5" name="Fußzeilenplatzhalter 4"/>
-          <p:cNvSpPr>
-            <a:spLocks noGrp="1"/>
-          </p:cNvSpPr>
-          <p:nvPr>
-            <p:ph type="ftr" sz="quarter" idx="11"/>
-          </p:nvPr>
-        </p:nvSpPr>
-        <p:spPr/>
-        <p:txBody>
-          <a:bodyPr/>
-          <a:lstStyle/>
-          <a:p>
-            <a:r>
-              <a:rPr lang="de-DE" smtClean="0"/>
-              <a:t>Group 4</a:t>
-            </a:r>
-            <a:endParaRPr lang="de-DE"/>
-          </a:p>
-        </p:txBody>
-      </p:sp>
-      <p:sp>
-        <p:nvSpPr>
-          <p:cNvPr id="6" name="Foliennummernplatzhalter 5"/>
-          <p:cNvSpPr>
-            <a:spLocks noGrp="1"/>
-          </p:cNvSpPr>
-          <p:nvPr>
-            <p:ph type="sldNum" sz="quarter" idx="12"/>
-          </p:nvPr>
-        </p:nvSpPr>
-        <p:spPr/>
-        <p:txBody>
-          <a:bodyPr/>
-          <a:lstStyle/>
-          <a:p>
-            <a:fld id="{54C3B571-D783-E845-AA51-C7B99A40CE52}" type="slidenum">
-              <a:rPr lang="de-DE" smtClean="0"/>
-              <a:t>6</a:t>
-            </a:fld>
-            <a:endParaRPr lang="de-DE"/>
-          </a:p>
-        </p:txBody>
-      </p:sp>
-    </p:spTree>
-    <p:extLst>
-      <p:ext uri="{BB962C8B-B14F-4D97-AF65-F5344CB8AC3E}">
-        <p14:creationId xmlns:p14="http://schemas.microsoft.com/office/powerpoint/2010/main" val="135149535"/>
-      </p:ext>
-    </p:extLst>
-  </p:cSld>
-  <p:clrMapOvr>
-    <a:masterClrMapping/>
-  </p:clrMapOvr>
-</p:sld>
-</file>
-
-<file path=ppt/slides/slide7.xml><?xml version="1.0" encoding="utf-8"?>
-<p:sld xmlns:a="http://schemas.openxmlformats.org/drawingml/2006/main" xmlns:r="http://schemas.openxmlformats.org/officeDocument/2006/relationships" xmlns:p="http://schemas.openxmlformats.org/presentationml/2006/main">
-  <p:cSld>
-    <p:spTree>
-      <p:nvGrpSpPr>
-        <p:cNvPr id="1" name=""/>
-        <p:cNvGrpSpPr/>
-        <p:nvPr/>
-      </p:nvGrpSpPr>
-      <p:grpSpPr>
-        <a:xfrm>
-          <a:off x="0" y="0"/>
-          <a:ext cx="0" cy="0"/>
-          <a:chOff x="0" y="0"/>
-          <a:chExt cx="0" cy="0"/>
-        </a:xfrm>
-      </p:grpSpPr>
-      <p:sp>
-        <p:nvSpPr>
-          <p:cNvPr id="2" name="Titel 1"/>
-          <p:cNvSpPr>
-            <a:spLocks noGrp="1"/>
-          </p:cNvSpPr>
-          <p:nvPr>
-            <p:ph type="title"/>
-          </p:nvPr>
-        </p:nvSpPr>
-        <p:spPr/>
-        <p:txBody>
-          <a:bodyPr/>
-          <a:lstStyle/>
-          <a:p>
-            <a:r>
-              <a:rPr lang="de-DE" dirty="0" smtClean="0"/>
-              <a:t>Piano roll </a:t>
-            </a:r>
-            <a:r>
-              <a:rPr lang="de-DE" dirty="0" err="1" smtClean="0"/>
-              <a:t>scanner</a:t>
-            </a:r>
-            <a:endParaRPr lang="de-DE" dirty="0"/>
-          </a:p>
-        </p:txBody>
-      </p:sp>
-      <p:sp>
-        <p:nvSpPr>
-          <p:cNvPr id="3" name="Inhaltsplatzhalter 2"/>
-          <p:cNvSpPr>
-            <a:spLocks noGrp="1"/>
-          </p:cNvSpPr>
-          <p:nvPr>
-            <p:ph idx="1"/>
-          </p:nvPr>
-        </p:nvSpPr>
-        <p:spPr/>
-        <p:txBody>
-          <a:bodyPr/>
-          <a:lstStyle/>
-          <a:p>
-            <a:endParaRPr lang="de-DE"/>
-          </a:p>
-        </p:txBody>
-      </p:sp>
-      <p:sp>
-        <p:nvSpPr>
-          <p:cNvPr id="4" name="Datumsplatzhalter 3"/>
-          <p:cNvSpPr>
-            <a:spLocks noGrp="1"/>
-          </p:cNvSpPr>
-          <p:nvPr>
-            <p:ph type="dt" sz="half" idx="10"/>
-          </p:nvPr>
-        </p:nvSpPr>
-        <p:spPr/>
-        <p:txBody>
-          <a:bodyPr/>
-          <a:lstStyle/>
-          <a:p>
-            <a:fld id="{048220EE-0B5D-1D4F-A698-CD85F79D8F31}" type="datetime1">
-              <a:rPr lang="de-CH" smtClean="0"/>
-              <a:t>19.07.12</a:t>
-            </a:fld>
-            <a:endParaRPr lang="de-DE"/>
-          </a:p>
-        </p:txBody>
-      </p:sp>
-      <p:sp>
-        <p:nvSpPr>
-          <p:cNvPr id="5" name="Fußzeilenplatzhalter 4"/>
-          <p:cNvSpPr>
-            <a:spLocks noGrp="1"/>
-          </p:cNvSpPr>
-          <p:nvPr>
-            <p:ph type="ftr" sz="quarter" idx="11"/>
-          </p:nvPr>
-        </p:nvSpPr>
-        <p:spPr/>
-        <p:txBody>
-          <a:bodyPr/>
-          <a:lstStyle/>
-          <a:p>
-            <a:r>
-              <a:rPr lang="de-DE" smtClean="0"/>
-              <a:t>Group 4</a:t>
-            </a:r>
-            <a:endParaRPr lang="de-DE"/>
-          </a:p>
-        </p:txBody>
-      </p:sp>
-      <p:sp>
-        <p:nvSpPr>
-          <p:cNvPr id="6" name="Foliennummernplatzhalter 5"/>
-          <p:cNvSpPr>
-            <a:spLocks noGrp="1"/>
-          </p:cNvSpPr>
-          <p:nvPr>
-            <p:ph type="sldNum" sz="quarter" idx="12"/>
-          </p:nvPr>
-        </p:nvSpPr>
-        <p:spPr/>
-        <p:txBody>
-          <a:bodyPr/>
-          <a:lstStyle/>
-          <a:p>
-            <a:fld id="{54C3B571-D783-E845-AA51-C7B99A40CE52}" type="slidenum">
-              <a:rPr lang="de-DE" smtClean="0"/>
-              <a:t>7</a:t>
-            </a:fld>
-            <a:endParaRPr lang="de-DE"/>
-          </a:p>
-        </p:txBody>
-      </p:sp>
-    </p:spTree>
-    <p:extLst>
-      <p:ext uri="{BB962C8B-B14F-4D97-AF65-F5344CB8AC3E}">
-        <p14:creationId xmlns:p14="http://schemas.microsoft.com/office/powerpoint/2010/main" val="1354710345"/>
-      </p:ext>
-    </p:extLst>
-  </p:cSld>
-  <p:clrMapOvr>
-    <a:masterClrMapping/>
-  </p:clrMapOvr>
-</p:sld>
-</file>
-
-<file path=ppt/slides/slide8.xml><?xml version="1.0" encoding="utf-8"?>
-<p:sld xmlns:a="http://schemas.openxmlformats.org/drawingml/2006/main" xmlns:r="http://schemas.openxmlformats.org/officeDocument/2006/relationships" xmlns:p="http://schemas.openxmlformats.org/presentationml/2006/main">
-  <p:cSld>
-    <p:spTree>
-      <p:nvGrpSpPr>
-        <p:cNvPr id="1" name=""/>
-        <p:cNvGrpSpPr/>
-        <p:nvPr/>
-      </p:nvGrpSpPr>
-      <p:grpSpPr>
-        <a:xfrm>
-          <a:off x="0" y="0"/>
-          <a:ext cx="0" cy="0"/>
-          <a:chOff x="0" y="0"/>
-          <a:chExt cx="0" cy="0"/>
-        </a:xfrm>
-      </p:grpSpPr>
-      <p:sp>
-        <p:nvSpPr>
-          <p:cNvPr id="2" name="Titel 1"/>
-          <p:cNvSpPr>
-            <a:spLocks noGrp="1"/>
-          </p:cNvSpPr>
-          <p:nvPr>
-            <p:ph type="title"/>
-          </p:nvPr>
-        </p:nvSpPr>
-        <p:spPr/>
-        <p:txBody>
-          <a:bodyPr/>
-          <a:lstStyle/>
-          <a:p>
-            <a:r>
-              <a:rPr lang="de-DE" dirty="0" smtClean="0"/>
-              <a:t>Scanner</a:t>
-            </a:r>
-            <a:endParaRPr lang="de-DE" dirty="0"/>
-          </a:p>
-        </p:txBody>
-      </p:sp>
-      <p:sp>
-        <p:nvSpPr>
-          <p:cNvPr id="4" name="Datumsplatzhalter 3"/>
-          <p:cNvSpPr>
-            <a:spLocks noGrp="1"/>
-          </p:cNvSpPr>
-          <p:nvPr>
-            <p:ph type="dt" sz="half" idx="10"/>
-          </p:nvPr>
-        </p:nvSpPr>
-        <p:spPr/>
-        <p:txBody>
-          <a:bodyPr/>
-          <a:lstStyle/>
-          <a:p>
-            <a:fld id="{048220EE-0B5D-1D4F-A698-CD85F79D8F31}" type="datetime1">
-              <a:rPr lang="de-CH" smtClean="0"/>
-              <a:t>19.07.12</a:t>
-            </a:fld>
-            <a:endParaRPr lang="de-DE"/>
-          </a:p>
-        </p:txBody>
-      </p:sp>
-      <p:sp>
-        <p:nvSpPr>
-          <p:cNvPr id="5" name="Fußzeilenplatzhalter 4"/>
-          <p:cNvSpPr>
-            <a:spLocks noGrp="1"/>
-          </p:cNvSpPr>
-          <p:nvPr>
-            <p:ph type="ftr" sz="quarter" idx="11"/>
-          </p:nvPr>
-        </p:nvSpPr>
-        <p:spPr/>
-        <p:txBody>
-          <a:bodyPr/>
-          <a:lstStyle/>
-          <a:p>
-            <a:r>
-              <a:rPr lang="de-DE" dirty="0" smtClean="0"/>
-              <a:t>Group 4</a:t>
-            </a:r>
-            <a:endParaRPr lang="de-DE" dirty="0"/>
-          </a:p>
-        </p:txBody>
-      </p:sp>
-      <p:sp>
-        <p:nvSpPr>
-          <p:cNvPr id="6" name="Foliennummernplatzhalter 5"/>
-          <p:cNvSpPr>
-            <a:spLocks noGrp="1"/>
-          </p:cNvSpPr>
-          <p:nvPr>
-            <p:ph type="sldNum" sz="quarter" idx="12"/>
-          </p:nvPr>
-        </p:nvSpPr>
-        <p:spPr/>
-        <p:txBody>
-          <a:bodyPr/>
-          <a:lstStyle/>
-          <a:p>
-            <a:fld id="{54C3B571-D783-E845-AA51-C7B99A40CE52}" type="slidenum">
-              <a:rPr lang="de-DE" smtClean="0"/>
-              <a:t>8</a:t>
+              <a:t>15</a:t>
             </a:fld>
             <a:endParaRPr lang="de-DE"/>
           </a:p>
@@ -5832,7 +5090,7 @@
         </p:blipFill>
         <p:spPr>
           <a:xfrm>
-            <a:off x="3606032" y="3503831"/>
+            <a:off x="3857222" y="3140954"/>
             <a:ext cx="5080768" cy="2622332"/>
           </a:xfrm>
           <a:prstGeom prst="rect">
@@ -5844,6 +5102,2233 @@
     <p:extLst>
       <p:ext uri="{BB962C8B-B14F-4D97-AF65-F5344CB8AC3E}">
         <p14:creationId xmlns:p14="http://schemas.microsoft.com/office/powerpoint/2010/main" val="624076163"/>
+      </p:ext>
+    </p:extLst>
+  </p:cSld>
+  <p:clrMapOvr>
+    <a:masterClrMapping/>
+  </p:clrMapOvr>
+  <p:timing>
+    <p:tnLst>
+      <p:par>
+        <p:cTn xmlns:p14="http://schemas.microsoft.com/office/powerpoint/2010/main" id="1" dur="indefinite" restart="never" nodeType="tmRoot"/>
+      </p:par>
+    </p:tnLst>
+  </p:timing>
+</p:sld>
+</file>
+
+<file path=ppt/slides/slide16.xml><?xml version="1.0" encoding="utf-8"?>
+<p:sld xmlns:a="http://schemas.openxmlformats.org/drawingml/2006/main" xmlns:r="http://schemas.openxmlformats.org/officeDocument/2006/relationships" xmlns:p="http://schemas.openxmlformats.org/presentationml/2006/main">
+  <p:cSld>
+    <p:spTree>
+      <p:nvGrpSpPr>
+        <p:cNvPr id="1" name=""/>
+        <p:cNvGrpSpPr/>
+        <p:nvPr/>
+      </p:nvGrpSpPr>
+      <p:grpSpPr>
+        <a:xfrm>
+          <a:off x="0" y="0"/>
+          <a:ext cx="0" cy="0"/>
+          <a:chOff x="0" y="0"/>
+          <a:chExt cx="0" cy="0"/>
+        </a:xfrm>
+      </p:grpSpPr>
+      <p:sp>
+        <p:nvSpPr>
+          <p:cNvPr id="2" name="Titel 1"/>
+          <p:cNvSpPr>
+            <a:spLocks noGrp="1"/>
+          </p:cNvSpPr>
+          <p:nvPr>
+            <p:ph type="title"/>
+          </p:nvPr>
+        </p:nvSpPr>
+        <p:spPr/>
+        <p:txBody>
+          <a:bodyPr/>
+          <a:lstStyle/>
+          <a:p>
+            <a:r>
+              <a:rPr lang="de-DE" dirty="0" smtClean="0"/>
+              <a:t>Data </a:t>
+            </a:r>
+            <a:r>
+              <a:rPr lang="de-DE" dirty="0" err="1" smtClean="0"/>
+              <a:t>processing</a:t>
+            </a:r>
+            <a:endParaRPr lang="de-DE" dirty="0"/>
+          </a:p>
+        </p:txBody>
+      </p:sp>
+      <p:sp>
+        <p:nvSpPr>
+          <p:cNvPr id="4" name="Datumsplatzhalter 3"/>
+          <p:cNvSpPr>
+            <a:spLocks noGrp="1"/>
+          </p:cNvSpPr>
+          <p:nvPr>
+            <p:ph type="dt" sz="half" idx="10"/>
+          </p:nvPr>
+        </p:nvSpPr>
+        <p:spPr/>
+        <p:txBody>
+          <a:bodyPr/>
+          <a:lstStyle/>
+          <a:p>
+            <a:fld id="{048220EE-0B5D-1D4F-A698-CD85F79D8F31}" type="datetime1">
+              <a:rPr lang="de-CH" smtClean="0"/>
+              <a:t>19.07.12</a:t>
+            </a:fld>
+            <a:endParaRPr lang="de-DE"/>
+          </a:p>
+        </p:txBody>
+      </p:sp>
+      <p:sp>
+        <p:nvSpPr>
+          <p:cNvPr id="5" name="Fußzeilenplatzhalter 4"/>
+          <p:cNvSpPr>
+            <a:spLocks noGrp="1"/>
+          </p:cNvSpPr>
+          <p:nvPr>
+            <p:ph type="ftr" sz="quarter" idx="11"/>
+          </p:nvPr>
+        </p:nvSpPr>
+        <p:spPr/>
+        <p:txBody>
+          <a:bodyPr/>
+          <a:lstStyle/>
+          <a:p>
+            <a:r>
+              <a:rPr lang="de-DE" smtClean="0"/>
+              <a:t>Group 4</a:t>
+            </a:r>
+            <a:endParaRPr lang="de-DE"/>
+          </a:p>
+        </p:txBody>
+      </p:sp>
+      <p:sp>
+        <p:nvSpPr>
+          <p:cNvPr id="6" name="Foliennummernplatzhalter 5"/>
+          <p:cNvSpPr>
+            <a:spLocks noGrp="1"/>
+          </p:cNvSpPr>
+          <p:nvPr>
+            <p:ph type="sldNum" sz="quarter" idx="12"/>
+          </p:nvPr>
+        </p:nvSpPr>
+        <p:spPr/>
+        <p:txBody>
+          <a:bodyPr/>
+          <a:lstStyle/>
+          <a:p>
+            <a:fld id="{54C3B571-D783-E845-AA51-C7B99A40CE52}" type="slidenum">
+              <a:rPr lang="de-DE" smtClean="0"/>
+              <a:t>16</a:t>
+            </a:fld>
+            <a:endParaRPr lang="de-DE"/>
+          </a:p>
+        </p:txBody>
+      </p:sp>
+      <p:sp>
+        <p:nvSpPr>
+          <p:cNvPr id="8" name="Inhaltsplatzhalter 7"/>
+          <p:cNvSpPr>
+            <a:spLocks noGrp="1"/>
+          </p:cNvSpPr>
+          <p:nvPr>
+            <p:ph idx="1"/>
+          </p:nvPr>
+        </p:nvSpPr>
+        <p:spPr/>
+        <p:txBody>
+          <a:bodyPr/>
+          <a:lstStyle/>
+          <a:p>
+            <a:r>
+              <a:rPr lang="de-DE" dirty="0" smtClean="0"/>
+              <a:t>Central </a:t>
+            </a:r>
+            <a:r>
+              <a:rPr lang="de-DE" dirty="0" err="1" smtClean="0"/>
+              <a:t>moment</a:t>
+            </a:r>
+            <a:r>
+              <a:rPr lang="de-DE" dirty="0" smtClean="0"/>
+              <a:t> </a:t>
+            </a:r>
+            <a:r>
+              <a:rPr lang="de-DE" dirty="0" err="1" smtClean="0"/>
+              <a:t>calculation</a:t>
+            </a:r>
+            <a:endParaRPr lang="de-DE" dirty="0" smtClean="0"/>
+          </a:p>
+          <a:p>
+            <a:r>
+              <a:rPr lang="de-DE" dirty="0" err="1" smtClean="0"/>
+              <a:t>Connected</a:t>
+            </a:r>
+            <a:r>
+              <a:rPr lang="de-DE" dirty="0" smtClean="0"/>
+              <a:t> </a:t>
+            </a:r>
+            <a:r>
+              <a:rPr lang="de-DE" dirty="0" err="1" smtClean="0"/>
+              <a:t>component</a:t>
+            </a:r>
+            <a:r>
+              <a:rPr lang="de-DE" dirty="0" smtClean="0"/>
+              <a:t> </a:t>
+            </a:r>
+            <a:r>
+              <a:rPr lang="de-DE" dirty="0" err="1" smtClean="0"/>
+              <a:t>labeling</a:t>
+            </a:r>
+            <a:endParaRPr lang="de-DE" dirty="0" smtClean="0"/>
+          </a:p>
+          <a:p>
+            <a:r>
+              <a:rPr lang="de-DE" dirty="0" smtClean="0"/>
+              <a:t>Template </a:t>
+            </a:r>
+            <a:r>
+              <a:rPr lang="de-DE" dirty="0" err="1" smtClean="0"/>
+              <a:t>matching</a:t>
+            </a:r>
+            <a:r>
+              <a:rPr lang="de-DE" dirty="0" smtClean="0"/>
+              <a:t> </a:t>
+            </a:r>
+            <a:r>
+              <a:rPr lang="de-DE" dirty="0" err="1" smtClean="0"/>
+              <a:t>algorithm</a:t>
+            </a:r>
+            <a:endParaRPr lang="de-DE" dirty="0"/>
+          </a:p>
+        </p:txBody>
+      </p:sp>
+    </p:spTree>
+    <p:extLst>
+      <p:ext uri="{BB962C8B-B14F-4D97-AF65-F5344CB8AC3E}">
+        <p14:creationId xmlns:p14="http://schemas.microsoft.com/office/powerpoint/2010/main" val="1817420570"/>
+      </p:ext>
+    </p:extLst>
+  </p:cSld>
+  <p:clrMapOvr>
+    <a:masterClrMapping/>
+  </p:clrMapOvr>
+  <p:timing>
+    <p:tnLst>
+      <p:par>
+        <p:cTn xmlns:p14="http://schemas.microsoft.com/office/powerpoint/2010/main" id="1" dur="indefinite" restart="never" nodeType="tmRoot"/>
+      </p:par>
+    </p:tnLst>
+  </p:timing>
+</p:sld>
+</file>
+
+<file path=ppt/slides/slide17.xml><?xml version="1.0" encoding="utf-8"?>
+<p:sld xmlns:a="http://schemas.openxmlformats.org/drawingml/2006/main" xmlns:r="http://schemas.openxmlformats.org/officeDocument/2006/relationships" xmlns:p="http://schemas.openxmlformats.org/presentationml/2006/main">
+  <p:cSld>
+    <p:spTree>
+      <p:nvGrpSpPr>
+        <p:cNvPr id="1" name=""/>
+        <p:cNvGrpSpPr/>
+        <p:nvPr/>
+      </p:nvGrpSpPr>
+      <p:grpSpPr>
+        <a:xfrm>
+          <a:off x="0" y="0"/>
+          <a:ext cx="0" cy="0"/>
+          <a:chOff x="0" y="0"/>
+          <a:chExt cx="0" cy="0"/>
+        </a:xfrm>
+      </p:grpSpPr>
+      <p:sp>
+        <p:nvSpPr>
+          <p:cNvPr id="2" name="Titel 1"/>
+          <p:cNvSpPr>
+            <a:spLocks noGrp="1"/>
+          </p:cNvSpPr>
+          <p:nvPr>
+            <p:ph type="title"/>
+          </p:nvPr>
+        </p:nvSpPr>
+        <p:spPr/>
+        <p:txBody>
+          <a:bodyPr/>
+          <a:lstStyle/>
+          <a:p>
+            <a:r>
+              <a:rPr lang="de-DE" dirty="0" smtClean="0"/>
+              <a:t>Data </a:t>
+            </a:r>
+            <a:r>
+              <a:rPr lang="de-DE" dirty="0" err="1" smtClean="0"/>
+              <a:t>processing</a:t>
+            </a:r>
+            <a:endParaRPr lang="de-DE" dirty="0"/>
+          </a:p>
+        </p:txBody>
+      </p:sp>
+      <p:sp>
+        <p:nvSpPr>
+          <p:cNvPr id="3" name="Inhaltsplatzhalter 2"/>
+          <p:cNvSpPr>
+            <a:spLocks noGrp="1"/>
+          </p:cNvSpPr>
+          <p:nvPr>
+            <p:ph idx="1"/>
+          </p:nvPr>
+        </p:nvSpPr>
+        <p:spPr/>
+        <p:txBody>
+          <a:bodyPr/>
+          <a:lstStyle/>
+          <a:p>
+            <a:endParaRPr lang="de-DE"/>
+          </a:p>
+        </p:txBody>
+      </p:sp>
+      <p:sp>
+        <p:nvSpPr>
+          <p:cNvPr id="4" name="Datumsplatzhalter 3"/>
+          <p:cNvSpPr>
+            <a:spLocks noGrp="1"/>
+          </p:cNvSpPr>
+          <p:nvPr>
+            <p:ph type="dt" sz="half" idx="10"/>
+          </p:nvPr>
+        </p:nvSpPr>
+        <p:spPr/>
+        <p:txBody>
+          <a:bodyPr/>
+          <a:lstStyle/>
+          <a:p>
+            <a:fld id="{048220EE-0B5D-1D4F-A698-CD85F79D8F31}" type="datetime1">
+              <a:rPr lang="de-CH" smtClean="0"/>
+              <a:t>19.07.12</a:t>
+            </a:fld>
+            <a:endParaRPr lang="de-DE"/>
+          </a:p>
+        </p:txBody>
+      </p:sp>
+      <p:sp>
+        <p:nvSpPr>
+          <p:cNvPr id="5" name="Fußzeilenplatzhalter 4"/>
+          <p:cNvSpPr>
+            <a:spLocks noGrp="1"/>
+          </p:cNvSpPr>
+          <p:nvPr>
+            <p:ph type="ftr" sz="quarter" idx="11"/>
+          </p:nvPr>
+        </p:nvSpPr>
+        <p:spPr/>
+        <p:txBody>
+          <a:bodyPr/>
+          <a:lstStyle/>
+          <a:p>
+            <a:r>
+              <a:rPr lang="de-DE" smtClean="0"/>
+              <a:t>Group 4</a:t>
+            </a:r>
+            <a:endParaRPr lang="de-DE"/>
+          </a:p>
+        </p:txBody>
+      </p:sp>
+      <p:sp>
+        <p:nvSpPr>
+          <p:cNvPr id="6" name="Foliennummernplatzhalter 5"/>
+          <p:cNvSpPr>
+            <a:spLocks noGrp="1"/>
+          </p:cNvSpPr>
+          <p:nvPr>
+            <p:ph type="sldNum" sz="quarter" idx="12"/>
+          </p:nvPr>
+        </p:nvSpPr>
+        <p:spPr/>
+        <p:txBody>
+          <a:bodyPr/>
+          <a:lstStyle/>
+          <a:p>
+            <a:fld id="{54C3B571-D783-E845-AA51-C7B99A40CE52}" type="slidenum">
+              <a:rPr lang="de-DE" smtClean="0"/>
+              <a:t>17</a:t>
+            </a:fld>
+            <a:endParaRPr lang="de-DE"/>
+          </a:p>
+        </p:txBody>
+      </p:sp>
+      <p:pic>
+        <p:nvPicPr>
+          <p:cNvPr id="7" name="Bild 6" descr="pattern_recognition.bmp"/>
+          <p:cNvPicPr>
+            <a:picLocks noChangeAspect="1"/>
+          </p:cNvPicPr>
+          <p:nvPr/>
+        </p:nvPicPr>
+        <p:blipFill>
+          <a:blip r:embed="rId2">
+            <a:extLst>
+              <a:ext uri="{28A0092B-C50C-407E-A947-70E740481C1C}">
+                <a14:useLocalDpi xmlns:a14="http://schemas.microsoft.com/office/drawing/2010/main" val="0"/>
+              </a:ext>
+            </a:extLst>
+          </a:blip>
+          <a:stretch>
+            <a:fillRect/>
+          </a:stretch>
+        </p:blipFill>
+        <p:spPr>
+          <a:xfrm>
+            <a:off x="457200" y="1985773"/>
+            <a:ext cx="8294542" cy="3673296"/>
+          </a:xfrm>
+          <a:prstGeom prst="rect">
+            <a:avLst/>
+          </a:prstGeom>
+        </p:spPr>
+      </p:pic>
+    </p:spTree>
+    <p:extLst>
+      <p:ext uri="{BB962C8B-B14F-4D97-AF65-F5344CB8AC3E}">
+        <p14:creationId xmlns:p14="http://schemas.microsoft.com/office/powerpoint/2010/main" val="3646141842"/>
+      </p:ext>
+    </p:extLst>
+  </p:cSld>
+  <p:clrMapOvr>
+    <a:masterClrMapping/>
+  </p:clrMapOvr>
+  <p:timing>
+    <p:tnLst>
+      <p:par>
+        <p:cTn xmlns:p14="http://schemas.microsoft.com/office/powerpoint/2010/main" id="1" dur="indefinite" restart="never" nodeType="tmRoot"/>
+      </p:par>
+    </p:tnLst>
+  </p:timing>
+</p:sld>
+</file>
+
+<file path=ppt/slides/slide18.xml><?xml version="1.0" encoding="utf-8"?>
+<p:sld xmlns:a="http://schemas.openxmlformats.org/drawingml/2006/main" xmlns:r="http://schemas.openxmlformats.org/officeDocument/2006/relationships" xmlns:p="http://schemas.openxmlformats.org/presentationml/2006/main">
+  <p:cSld>
+    <p:spTree>
+      <p:nvGrpSpPr>
+        <p:cNvPr id="1" name=""/>
+        <p:cNvGrpSpPr/>
+        <p:nvPr/>
+      </p:nvGrpSpPr>
+      <p:grpSpPr>
+        <a:xfrm>
+          <a:off x="0" y="0"/>
+          <a:ext cx="0" cy="0"/>
+          <a:chOff x="0" y="0"/>
+          <a:chExt cx="0" cy="0"/>
+        </a:xfrm>
+      </p:grpSpPr>
+      <p:sp>
+        <p:nvSpPr>
+          <p:cNvPr id="2" name="Titel 1"/>
+          <p:cNvSpPr>
+            <a:spLocks noGrp="1"/>
+          </p:cNvSpPr>
+          <p:nvPr>
+            <p:ph type="title"/>
+          </p:nvPr>
+        </p:nvSpPr>
+        <p:spPr/>
+        <p:txBody>
+          <a:bodyPr/>
+          <a:lstStyle/>
+          <a:p>
+            <a:r>
+              <a:rPr lang="de-DE" dirty="0" err="1" smtClean="0"/>
+              <a:t>Conclusion</a:t>
+            </a:r>
+            <a:endParaRPr lang="de-DE" dirty="0"/>
+          </a:p>
+        </p:txBody>
+      </p:sp>
+      <p:sp>
+        <p:nvSpPr>
+          <p:cNvPr id="3" name="Inhaltsplatzhalter 2"/>
+          <p:cNvSpPr>
+            <a:spLocks noGrp="1"/>
+          </p:cNvSpPr>
+          <p:nvPr>
+            <p:ph idx="1"/>
+          </p:nvPr>
+        </p:nvSpPr>
+        <p:spPr/>
+        <p:txBody>
+          <a:bodyPr/>
+          <a:lstStyle/>
+          <a:p>
+            <a:r>
+              <a:rPr lang="de-DE" dirty="0" smtClean="0">
+                <a:solidFill>
+                  <a:srgbClr val="008000"/>
+                </a:solidFill>
+              </a:rPr>
+              <a:t>Flexible </a:t>
+            </a:r>
+            <a:r>
+              <a:rPr lang="de-DE" dirty="0" err="1" smtClean="0">
+                <a:solidFill>
+                  <a:srgbClr val="008000"/>
+                </a:solidFill>
+              </a:rPr>
+              <a:t>data</a:t>
+            </a:r>
+            <a:r>
+              <a:rPr lang="de-DE" dirty="0" smtClean="0">
+                <a:solidFill>
+                  <a:srgbClr val="008000"/>
+                </a:solidFill>
+              </a:rPr>
+              <a:t> </a:t>
+            </a:r>
+            <a:r>
+              <a:rPr lang="de-DE" dirty="0" err="1" smtClean="0">
+                <a:solidFill>
+                  <a:srgbClr val="008000"/>
+                </a:solidFill>
+              </a:rPr>
+              <a:t>output</a:t>
+            </a:r>
+            <a:endParaRPr lang="de-DE" dirty="0" smtClean="0">
+              <a:solidFill>
+                <a:srgbClr val="008000"/>
+              </a:solidFill>
+            </a:endParaRPr>
+          </a:p>
+          <a:p>
+            <a:r>
+              <a:rPr lang="de-DE" dirty="0" err="1" smtClean="0">
+                <a:solidFill>
+                  <a:srgbClr val="008000"/>
+                </a:solidFill>
+              </a:rPr>
+              <a:t>Positioning</a:t>
+            </a:r>
+            <a:endParaRPr lang="de-DE" dirty="0" smtClean="0">
+              <a:solidFill>
+                <a:srgbClr val="008000"/>
+              </a:solidFill>
+            </a:endParaRPr>
+          </a:p>
+          <a:p>
+            <a:r>
+              <a:rPr lang="de-DE" dirty="0" smtClean="0">
+                <a:solidFill>
+                  <a:srgbClr val="953735"/>
+                </a:solidFill>
+              </a:rPr>
+              <a:t>Expensive </a:t>
+            </a:r>
+            <a:r>
+              <a:rPr lang="de-DE" dirty="0" err="1" smtClean="0">
+                <a:solidFill>
+                  <a:srgbClr val="953735"/>
+                </a:solidFill>
+              </a:rPr>
+              <a:t>scanner</a:t>
+            </a:r>
+            <a:endParaRPr lang="de-DE" dirty="0">
+              <a:solidFill>
+                <a:srgbClr val="953735"/>
+              </a:solidFill>
+            </a:endParaRPr>
+          </a:p>
+        </p:txBody>
+      </p:sp>
+      <p:sp>
+        <p:nvSpPr>
+          <p:cNvPr id="4" name="Datumsplatzhalter 3"/>
+          <p:cNvSpPr>
+            <a:spLocks noGrp="1"/>
+          </p:cNvSpPr>
+          <p:nvPr>
+            <p:ph type="dt" sz="half" idx="10"/>
+          </p:nvPr>
+        </p:nvSpPr>
+        <p:spPr/>
+        <p:txBody>
+          <a:bodyPr/>
+          <a:lstStyle/>
+          <a:p>
+            <a:fld id="{048220EE-0B5D-1D4F-A698-CD85F79D8F31}" type="datetime1">
+              <a:rPr lang="de-CH" smtClean="0"/>
+              <a:t>20.07.12</a:t>
+            </a:fld>
+            <a:endParaRPr lang="de-DE"/>
+          </a:p>
+        </p:txBody>
+      </p:sp>
+      <p:sp>
+        <p:nvSpPr>
+          <p:cNvPr id="5" name="Fußzeilenplatzhalter 4"/>
+          <p:cNvSpPr>
+            <a:spLocks noGrp="1"/>
+          </p:cNvSpPr>
+          <p:nvPr>
+            <p:ph type="ftr" sz="quarter" idx="11"/>
+          </p:nvPr>
+        </p:nvSpPr>
+        <p:spPr/>
+        <p:txBody>
+          <a:bodyPr/>
+          <a:lstStyle/>
+          <a:p>
+            <a:r>
+              <a:rPr lang="de-DE" smtClean="0"/>
+              <a:t>Group 4</a:t>
+            </a:r>
+            <a:endParaRPr lang="de-DE"/>
+          </a:p>
+        </p:txBody>
+      </p:sp>
+      <p:sp>
+        <p:nvSpPr>
+          <p:cNvPr id="6" name="Foliennummernplatzhalter 5"/>
+          <p:cNvSpPr>
+            <a:spLocks noGrp="1"/>
+          </p:cNvSpPr>
+          <p:nvPr>
+            <p:ph type="sldNum" sz="quarter" idx="12"/>
+          </p:nvPr>
+        </p:nvSpPr>
+        <p:spPr/>
+        <p:txBody>
+          <a:bodyPr/>
+          <a:lstStyle/>
+          <a:p>
+            <a:fld id="{54C3B571-D783-E845-AA51-C7B99A40CE52}" type="slidenum">
+              <a:rPr lang="de-DE" smtClean="0"/>
+              <a:t>18</a:t>
+            </a:fld>
+            <a:endParaRPr lang="de-DE"/>
+          </a:p>
+        </p:txBody>
+      </p:sp>
+    </p:spTree>
+    <p:extLst>
+      <p:ext uri="{BB962C8B-B14F-4D97-AF65-F5344CB8AC3E}">
+        <p14:creationId xmlns:p14="http://schemas.microsoft.com/office/powerpoint/2010/main" val="2526932634"/>
+      </p:ext>
+    </p:extLst>
+  </p:cSld>
+  <p:clrMapOvr>
+    <a:masterClrMapping/>
+  </p:clrMapOvr>
+  <p:timing>
+    <p:tnLst>
+      <p:par>
+        <p:cTn xmlns:p14="http://schemas.microsoft.com/office/powerpoint/2010/main" id="1" dur="indefinite" restart="never" nodeType="tmRoot"/>
+      </p:par>
+    </p:tnLst>
+  </p:timing>
+</p:sld>
+</file>
+
+<file path=ppt/slides/slide19.xml><?xml version="1.0" encoding="utf-8"?>
+<p:sld xmlns:a="http://schemas.openxmlformats.org/drawingml/2006/main" xmlns:r="http://schemas.openxmlformats.org/officeDocument/2006/relationships" xmlns:p="http://schemas.openxmlformats.org/presentationml/2006/main">
+  <p:cSld>
+    <p:spTree>
+      <p:nvGrpSpPr>
+        <p:cNvPr id="1" name=""/>
+        <p:cNvGrpSpPr/>
+        <p:nvPr/>
+      </p:nvGrpSpPr>
+      <p:grpSpPr>
+        <a:xfrm>
+          <a:off x="0" y="0"/>
+          <a:ext cx="0" cy="0"/>
+          <a:chOff x="0" y="0"/>
+          <a:chExt cx="0" cy="0"/>
+        </a:xfrm>
+      </p:grpSpPr>
+      <p:sp>
+        <p:nvSpPr>
+          <p:cNvPr id="2" name="Titel 1"/>
+          <p:cNvSpPr>
+            <a:spLocks noGrp="1"/>
+          </p:cNvSpPr>
+          <p:nvPr>
+            <p:ph type="title"/>
+          </p:nvPr>
+        </p:nvSpPr>
+        <p:spPr/>
+        <p:txBody>
+          <a:bodyPr/>
+          <a:lstStyle/>
+          <a:p>
+            <a:r>
+              <a:rPr lang="de-DE" dirty="0" smtClean="0"/>
+              <a:t>Further </a:t>
+            </a:r>
+            <a:r>
+              <a:rPr lang="de-DE" dirty="0" err="1" smtClean="0"/>
+              <a:t>work</a:t>
+            </a:r>
+            <a:endParaRPr lang="de-DE" dirty="0"/>
+          </a:p>
+        </p:txBody>
+      </p:sp>
+      <p:sp>
+        <p:nvSpPr>
+          <p:cNvPr id="3" name="Inhaltsplatzhalter 2"/>
+          <p:cNvSpPr>
+            <a:spLocks noGrp="1"/>
+          </p:cNvSpPr>
+          <p:nvPr>
+            <p:ph idx="1"/>
+          </p:nvPr>
+        </p:nvSpPr>
+        <p:spPr/>
+        <p:txBody>
+          <a:bodyPr/>
+          <a:lstStyle/>
+          <a:p>
+            <a:r>
+              <a:rPr lang="de-DE" dirty="0" err="1" smtClean="0"/>
+              <a:t>Smaller</a:t>
+            </a:r>
+            <a:endParaRPr lang="de-DE" dirty="0" smtClean="0"/>
+          </a:p>
+          <a:p>
+            <a:r>
+              <a:rPr lang="de-DE" dirty="0" err="1" smtClean="0"/>
+              <a:t>Better</a:t>
+            </a:r>
+            <a:r>
+              <a:rPr lang="de-DE" dirty="0" smtClean="0"/>
+              <a:t> </a:t>
+            </a:r>
+            <a:r>
+              <a:rPr lang="de-DE" dirty="0" err="1" smtClean="0"/>
+              <a:t>speed</a:t>
+            </a:r>
+            <a:r>
+              <a:rPr lang="de-DE" dirty="0" smtClean="0"/>
+              <a:t> </a:t>
+            </a:r>
+            <a:r>
+              <a:rPr lang="de-DE" dirty="0" err="1" smtClean="0"/>
+              <a:t>recognition</a:t>
+            </a:r>
+            <a:endParaRPr lang="de-DE" dirty="0" smtClean="0"/>
+          </a:p>
+          <a:p>
+            <a:r>
+              <a:rPr lang="de-DE" dirty="0" smtClean="0"/>
+              <a:t>MIDI </a:t>
+            </a:r>
+            <a:r>
+              <a:rPr lang="de-DE" dirty="0" err="1" smtClean="0"/>
+              <a:t>output</a:t>
+            </a:r>
+            <a:endParaRPr lang="de-DE" dirty="0" smtClean="0"/>
+          </a:p>
+          <a:p>
+            <a:endParaRPr lang="de-DE" dirty="0" smtClean="0"/>
+          </a:p>
+          <a:p>
+            <a:endParaRPr lang="de-DE" dirty="0"/>
+          </a:p>
+        </p:txBody>
+      </p:sp>
+      <p:sp>
+        <p:nvSpPr>
+          <p:cNvPr id="4" name="Datumsplatzhalter 3"/>
+          <p:cNvSpPr>
+            <a:spLocks noGrp="1"/>
+          </p:cNvSpPr>
+          <p:nvPr>
+            <p:ph type="dt" sz="half" idx="10"/>
+          </p:nvPr>
+        </p:nvSpPr>
+        <p:spPr/>
+        <p:txBody>
+          <a:bodyPr/>
+          <a:lstStyle/>
+          <a:p>
+            <a:fld id="{048220EE-0B5D-1D4F-A698-CD85F79D8F31}" type="datetime1">
+              <a:rPr lang="de-CH" smtClean="0"/>
+              <a:t>19.07.12</a:t>
+            </a:fld>
+            <a:endParaRPr lang="de-DE"/>
+          </a:p>
+        </p:txBody>
+      </p:sp>
+      <p:sp>
+        <p:nvSpPr>
+          <p:cNvPr id="5" name="Fußzeilenplatzhalter 4"/>
+          <p:cNvSpPr>
+            <a:spLocks noGrp="1"/>
+          </p:cNvSpPr>
+          <p:nvPr>
+            <p:ph type="ftr" sz="quarter" idx="11"/>
+          </p:nvPr>
+        </p:nvSpPr>
+        <p:spPr/>
+        <p:txBody>
+          <a:bodyPr/>
+          <a:lstStyle/>
+          <a:p>
+            <a:r>
+              <a:rPr lang="de-DE" smtClean="0"/>
+              <a:t>Group 4</a:t>
+            </a:r>
+            <a:endParaRPr lang="de-DE"/>
+          </a:p>
+        </p:txBody>
+      </p:sp>
+      <p:sp>
+        <p:nvSpPr>
+          <p:cNvPr id="6" name="Foliennummernplatzhalter 5"/>
+          <p:cNvSpPr>
+            <a:spLocks noGrp="1"/>
+          </p:cNvSpPr>
+          <p:nvPr>
+            <p:ph type="sldNum" sz="quarter" idx="12"/>
+          </p:nvPr>
+        </p:nvSpPr>
+        <p:spPr/>
+        <p:txBody>
+          <a:bodyPr/>
+          <a:lstStyle/>
+          <a:p>
+            <a:fld id="{54C3B571-D783-E845-AA51-C7B99A40CE52}" type="slidenum">
+              <a:rPr lang="de-DE" smtClean="0"/>
+              <a:t>19</a:t>
+            </a:fld>
+            <a:endParaRPr lang="de-DE"/>
+          </a:p>
+        </p:txBody>
+      </p:sp>
+    </p:spTree>
+    <p:extLst>
+      <p:ext uri="{BB962C8B-B14F-4D97-AF65-F5344CB8AC3E}">
+        <p14:creationId xmlns:p14="http://schemas.microsoft.com/office/powerpoint/2010/main" val="1481005516"/>
+      </p:ext>
+    </p:extLst>
+  </p:cSld>
+  <p:clrMapOvr>
+    <a:masterClrMapping/>
+  </p:clrMapOvr>
+  <p:timing>
+    <p:tnLst>
+      <p:par>
+        <p:cTn xmlns:p14="http://schemas.microsoft.com/office/powerpoint/2010/main" id="1" dur="indefinite" restart="never" nodeType="tmRoot"/>
+      </p:par>
+    </p:tnLst>
+  </p:timing>
+</p:sld>
+</file>
+
+<file path=ppt/slides/slide2.xml><?xml version="1.0" encoding="utf-8"?>
+<p:sld xmlns:a="http://schemas.openxmlformats.org/drawingml/2006/main" xmlns:r="http://schemas.openxmlformats.org/officeDocument/2006/relationships" xmlns:p="http://schemas.openxmlformats.org/presentationml/2006/main">
+  <p:cSld>
+    <p:spTree>
+      <p:nvGrpSpPr>
+        <p:cNvPr id="1" name=""/>
+        <p:cNvGrpSpPr/>
+        <p:nvPr/>
+      </p:nvGrpSpPr>
+      <p:grpSpPr>
+        <a:xfrm>
+          <a:off x="0" y="0"/>
+          <a:ext cx="0" cy="0"/>
+          <a:chOff x="0" y="0"/>
+          <a:chExt cx="0" cy="0"/>
+        </a:xfrm>
+      </p:grpSpPr>
+      <p:sp>
+        <p:nvSpPr>
+          <p:cNvPr id="2" name="Titel 1"/>
+          <p:cNvSpPr>
+            <a:spLocks noGrp="1"/>
+          </p:cNvSpPr>
+          <p:nvPr>
+            <p:ph type="title"/>
+          </p:nvPr>
+        </p:nvSpPr>
+        <p:spPr/>
+        <p:txBody>
+          <a:bodyPr/>
+          <a:lstStyle/>
+          <a:p>
+            <a:r>
+              <a:rPr lang="de-DE" dirty="0" smtClean="0"/>
+              <a:t>Content</a:t>
+            </a:r>
+            <a:endParaRPr lang="de-DE" dirty="0"/>
+          </a:p>
+        </p:txBody>
+      </p:sp>
+      <p:sp>
+        <p:nvSpPr>
+          <p:cNvPr id="3" name="Inhaltsplatzhalter 2"/>
+          <p:cNvSpPr>
+            <a:spLocks noGrp="1"/>
+          </p:cNvSpPr>
+          <p:nvPr>
+            <p:ph idx="1"/>
+          </p:nvPr>
+        </p:nvSpPr>
+        <p:spPr/>
+        <p:txBody>
+          <a:bodyPr>
+            <a:normAutofit/>
+          </a:bodyPr>
+          <a:lstStyle/>
+          <a:p>
+            <a:r>
+              <a:rPr lang="de-DE" dirty="0" smtClean="0"/>
+              <a:t>Problem </a:t>
+            </a:r>
+            <a:r>
+              <a:rPr lang="de-DE" dirty="0" err="1" smtClean="0"/>
+              <a:t>description</a:t>
+            </a:r>
+            <a:endParaRPr lang="de-DE" dirty="0" smtClean="0"/>
+          </a:p>
+          <a:p>
+            <a:r>
+              <a:rPr lang="de-DE" dirty="0" smtClean="0"/>
+              <a:t>Piano roll </a:t>
+            </a:r>
+            <a:r>
+              <a:rPr lang="de-DE" dirty="0" err="1" smtClean="0"/>
+              <a:t>scanner</a:t>
+            </a:r>
+            <a:r>
+              <a:rPr lang="de-DE" dirty="0" smtClean="0"/>
+              <a:t> </a:t>
+            </a:r>
+          </a:p>
+          <a:p>
+            <a:r>
+              <a:rPr lang="de-DE" dirty="0" smtClean="0"/>
+              <a:t>Scanner </a:t>
+            </a:r>
+            <a:r>
+              <a:rPr lang="de-DE" dirty="0" err="1" smtClean="0"/>
+              <a:t>module</a:t>
+            </a:r>
+            <a:endParaRPr lang="de-DE" dirty="0" smtClean="0"/>
+          </a:p>
+          <a:p>
+            <a:r>
+              <a:rPr lang="de-DE" dirty="0" smtClean="0"/>
+              <a:t>Data </a:t>
+            </a:r>
+            <a:r>
+              <a:rPr lang="de-DE" dirty="0" err="1" smtClean="0"/>
+              <a:t>processing</a:t>
+            </a:r>
+            <a:endParaRPr lang="de-DE" dirty="0" smtClean="0"/>
+          </a:p>
+          <a:p>
+            <a:r>
+              <a:rPr lang="de-DE" dirty="0" err="1" smtClean="0"/>
+              <a:t>Conclusion</a:t>
+            </a:r>
+            <a:endParaRPr lang="de-DE" dirty="0" smtClean="0"/>
+          </a:p>
+          <a:p>
+            <a:r>
+              <a:rPr lang="de-DE" dirty="0" smtClean="0"/>
+              <a:t>Further </a:t>
+            </a:r>
+            <a:r>
+              <a:rPr lang="de-DE" dirty="0" err="1" smtClean="0"/>
+              <a:t>works</a:t>
+            </a:r>
+            <a:endParaRPr lang="de-DE" dirty="0" smtClean="0"/>
+          </a:p>
+          <a:p>
+            <a:r>
+              <a:rPr lang="de-DE" dirty="0" err="1" smtClean="0"/>
+              <a:t>Questions</a:t>
+            </a:r>
+            <a:endParaRPr lang="de-DE" dirty="0"/>
+          </a:p>
+        </p:txBody>
+      </p:sp>
+      <p:sp>
+        <p:nvSpPr>
+          <p:cNvPr id="4" name="Datumsplatzhalter 3"/>
+          <p:cNvSpPr>
+            <a:spLocks noGrp="1"/>
+          </p:cNvSpPr>
+          <p:nvPr>
+            <p:ph type="dt" sz="half" idx="10"/>
+          </p:nvPr>
+        </p:nvSpPr>
+        <p:spPr/>
+        <p:txBody>
+          <a:bodyPr/>
+          <a:lstStyle/>
+          <a:p>
+            <a:fld id="{048220EE-0B5D-1D4F-A698-CD85F79D8F31}" type="datetime1">
+              <a:rPr lang="de-CH" smtClean="0"/>
+              <a:t>19.07.12</a:t>
+            </a:fld>
+            <a:endParaRPr lang="de-DE"/>
+          </a:p>
+        </p:txBody>
+      </p:sp>
+      <p:sp>
+        <p:nvSpPr>
+          <p:cNvPr id="5" name="Fußzeilenplatzhalter 4"/>
+          <p:cNvSpPr>
+            <a:spLocks noGrp="1"/>
+          </p:cNvSpPr>
+          <p:nvPr>
+            <p:ph type="ftr" sz="quarter" idx="11"/>
+          </p:nvPr>
+        </p:nvSpPr>
+        <p:spPr/>
+        <p:txBody>
+          <a:bodyPr/>
+          <a:lstStyle/>
+          <a:p>
+            <a:r>
+              <a:rPr lang="de-DE" smtClean="0"/>
+              <a:t>Group 4</a:t>
+            </a:r>
+            <a:endParaRPr lang="de-DE"/>
+          </a:p>
+        </p:txBody>
+      </p:sp>
+      <p:sp>
+        <p:nvSpPr>
+          <p:cNvPr id="6" name="Foliennummernplatzhalter 5"/>
+          <p:cNvSpPr>
+            <a:spLocks noGrp="1"/>
+          </p:cNvSpPr>
+          <p:nvPr>
+            <p:ph type="sldNum" sz="quarter" idx="12"/>
+          </p:nvPr>
+        </p:nvSpPr>
+        <p:spPr/>
+        <p:txBody>
+          <a:bodyPr/>
+          <a:lstStyle/>
+          <a:p>
+            <a:fld id="{54C3B571-D783-E845-AA51-C7B99A40CE52}" type="slidenum">
+              <a:rPr lang="de-DE" smtClean="0"/>
+              <a:t>2</a:t>
+            </a:fld>
+            <a:endParaRPr lang="de-DE"/>
+          </a:p>
+        </p:txBody>
+      </p:sp>
+    </p:spTree>
+    <p:extLst>
+      <p:ext uri="{BB962C8B-B14F-4D97-AF65-F5344CB8AC3E}">
+        <p14:creationId xmlns:p14="http://schemas.microsoft.com/office/powerpoint/2010/main" val="1123233064"/>
+      </p:ext>
+    </p:extLst>
+  </p:cSld>
+  <p:clrMapOvr>
+    <a:masterClrMapping/>
+  </p:clrMapOvr>
+  <p:timing>
+    <p:tnLst>
+      <p:par>
+        <p:cTn xmlns:p14="http://schemas.microsoft.com/office/powerpoint/2010/main" id="1" dur="indefinite" restart="never" nodeType="tmRoot"/>
+      </p:par>
+    </p:tnLst>
+  </p:timing>
+</p:sld>
+</file>
+
+<file path=ppt/slides/slide20.xml><?xml version="1.0" encoding="utf-8"?>
+<p:sld xmlns:a="http://schemas.openxmlformats.org/drawingml/2006/main" xmlns:r="http://schemas.openxmlformats.org/officeDocument/2006/relationships" xmlns:p="http://schemas.openxmlformats.org/presentationml/2006/main">
+  <p:cSld>
+    <p:spTree>
+      <p:nvGrpSpPr>
+        <p:cNvPr id="1" name=""/>
+        <p:cNvGrpSpPr/>
+        <p:nvPr/>
+      </p:nvGrpSpPr>
+      <p:grpSpPr>
+        <a:xfrm>
+          <a:off x="0" y="0"/>
+          <a:ext cx="0" cy="0"/>
+          <a:chOff x="0" y="0"/>
+          <a:chExt cx="0" cy="0"/>
+        </a:xfrm>
+      </p:grpSpPr>
+      <p:sp>
+        <p:nvSpPr>
+          <p:cNvPr id="2" name="Titel 1"/>
+          <p:cNvSpPr>
+            <a:spLocks noGrp="1"/>
+          </p:cNvSpPr>
+          <p:nvPr>
+            <p:ph type="title"/>
+          </p:nvPr>
+        </p:nvSpPr>
+        <p:spPr/>
+        <p:txBody>
+          <a:bodyPr/>
+          <a:lstStyle/>
+          <a:p>
+            <a:r>
+              <a:rPr lang="de-DE" dirty="0" err="1" smtClean="0"/>
+              <a:t>Thank</a:t>
+            </a:r>
+            <a:r>
+              <a:rPr lang="de-DE" dirty="0" smtClean="0"/>
+              <a:t> </a:t>
+            </a:r>
+            <a:r>
+              <a:rPr lang="de-DE" dirty="0" err="1" smtClean="0"/>
+              <a:t>you</a:t>
+            </a:r>
+            <a:r>
+              <a:rPr lang="de-DE" dirty="0" smtClean="0"/>
+              <a:t>!</a:t>
+            </a:r>
+            <a:endParaRPr lang="de-DE" dirty="0"/>
+          </a:p>
+        </p:txBody>
+      </p:sp>
+      <p:sp>
+        <p:nvSpPr>
+          <p:cNvPr id="3" name="Inhaltsplatzhalter 2"/>
+          <p:cNvSpPr>
+            <a:spLocks noGrp="1"/>
+          </p:cNvSpPr>
+          <p:nvPr>
+            <p:ph idx="1"/>
+          </p:nvPr>
+        </p:nvSpPr>
+        <p:spPr/>
+        <p:txBody>
+          <a:bodyPr/>
+          <a:lstStyle/>
+          <a:p>
+            <a:r>
+              <a:rPr lang="de-DE" dirty="0" err="1" smtClean="0"/>
+              <a:t>Any</a:t>
+            </a:r>
+            <a:r>
+              <a:rPr lang="de-DE" dirty="0" smtClean="0"/>
+              <a:t> </a:t>
+            </a:r>
+            <a:r>
+              <a:rPr lang="de-DE" dirty="0" err="1" smtClean="0"/>
+              <a:t>questions</a:t>
+            </a:r>
+            <a:r>
+              <a:rPr lang="de-DE" dirty="0" smtClean="0"/>
+              <a:t>?</a:t>
+            </a:r>
+            <a:endParaRPr lang="de-DE" dirty="0"/>
+          </a:p>
+        </p:txBody>
+      </p:sp>
+      <p:sp>
+        <p:nvSpPr>
+          <p:cNvPr id="4" name="Datumsplatzhalter 3"/>
+          <p:cNvSpPr>
+            <a:spLocks noGrp="1"/>
+          </p:cNvSpPr>
+          <p:nvPr>
+            <p:ph type="dt" sz="half" idx="10"/>
+          </p:nvPr>
+        </p:nvSpPr>
+        <p:spPr/>
+        <p:txBody>
+          <a:bodyPr/>
+          <a:lstStyle/>
+          <a:p>
+            <a:fld id="{048220EE-0B5D-1D4F-A698-CD85F79D8F31}" type="datetime1">
+              <a:rPr lang="de-CH" smtClean="0"/>
+              <a:t>19.07.12</a:t>
+            </a:fld>
+            <a:endParaRPr lang="de-DE"/>
+          </a:p>
+        </p:txBody>
+      </p:sp>
+      <p:sp>
+        <p:nvSpPr>
+          <p:cNvPr id="5" name="Fußzeilenplatzhalter 4"/>
+          <p:cNvSpPr>
+            <a:spLocks noGrp="1"/>
+          </p:cNvSpPr>
+          <p:nvPr>
+            <p:ph type="ftr" sz="quarter" idx="11"/>
+          </p:nvPr>
+        </p:nvSpPr>
+        <p:spPr/>
+        <p:txBody>
+          <a:bodyPr/>
+          <a:lstStyle/>
+          <a:p>
+            <a:r>
+              <a:rPr lang="de-DE" smtClean="0"/>
+              <a:t>Group 4</a:t>
+            </a:r>
+            <a:endParaRPr lang="de-DE"/>
+          </a:p>
+        </p:txBody>
+      </p:sp>
+      <p:sp>
+        <p:nvSpPr>
+          <p:cNvPr id="6" name="Foliennummernplatzhalter 5"/>
+          <p:cNvSpPr>
+            <a:spLocks noGrp="1"/>
+          </p:cNvSpPr>
+          <p:nvPr>
+            <p:ph type="sldNum" sz="quarter" idx="12"/>
+          </p:nvPr>
+        </p:nvSpPr>
+        <p:spPr/>
+        <p:txBody>
+          <a:bodyPr/>
+          <a:lstStyle/>
+          <a:p>
+            <a:fld id="{54C3B571-D783-E845-AA51-C7B99A40CE52}" type="slidenum">
+              <a:rPr lang="de-DE" smtClean="0"/>
+              <a:t>20</a:t>
+            </a:fld>
+            <a:endParaRPr lang="de-DE"/>
+          </a:p>
+        </p:txBody>
+      </p:sp>
+    </p:spTree>
+    <p:extLst>
+      <p:ext uri="{BB962C8B-B14F-4D97-AF65-F5344CB8AC3E}">
+        <p14:creationId xmlns:p14="http://schemas.microsoft.com/office/powerpoint/2010/main" val="1243045272"/>
+      </p:ext>
+    </p:extLst>
+  </p:cSld>
+  <p:clrMapOvr>
+    <a:masterClrMapping/>
+  </p:clrMapOvr>
+  <p:timing>
+    <p:tnLst>
+      <p:par>
+        <p:cTn xmlns:p14="http://schemas.microsoft.com/office/powerpoint/2010/main" id="1" dur="indefinite" restart="never" nodeType="tmRoot"/>
+      </p:par>
+    </p:tnLst>
+  </p:timing>
+</p:sld>
+</file>
+
+<file path=ppt/slides/slide3.xml><?xml version="1.0" encoding="utf-8"?>
+<p:sld xmlns:a="http://schemas.openxmlformats.org/drawingml/2006/main" xmlns:r="http://schemas.openxmlformats.org/officeDocument/2006/relationships" xmlns:p="http://schemas.openxmlformats.org/presentationml/2006/main">
+  <p:cSld>
+    <p:spTree>
+      <p:nvGrpSpPr>
+        <p:cNvPr id="1" name=""/>
+        <p:cNvGrpSpPr/>
+        <p:nvPr/>
+      </p:nvGrpSpPr>
+      <p:grpSpPr>
+        <a:xfrm>
+          <a:off x="0" y="0"/>
+          <a:ext cx="0" cy="0"/>
+          <a:chOff x="0" y="0"/>
+          <a:chExt cx="0" cy="0"/>
+        </a:xfrm>
+      </p:grpSpPr>
+      <p:sp>
+        <p:nvSpPr>
+          <p:cNvPr id="2" name="Titel 1"/>
+          <p:cNvSpPr>
+            <a:spLocks noGrp="1"/>
+          </p:cNvSpPr>
+          <p:nvPr>
+            <p:ph type="title"/>
+          </p:nvPr>
+        </p:nvSpPr>
+        <p:spPr/>
+        <p:txBody>
+          <a:bodyPr/>
+          <a:lstStyle/>
+          <a:p>
+            <a:r>
+              <a:rPr lang="de-DE" dirty="0" smtClean="0"/>
+              <a:t>Problem </a:t>
+            </a:r>
+            <a:r>
+              <a:rPr lang="de-DE" dirty="0" err="1" smtClean="0"/>
+              <a:t>description</a:t>
+            </a:r>
+            <a:endParaRPr lang="de-DE" dirty="0"/>
+          </a:p>
+        </p:txBody>
+      </p:sp>
+      <p:sp>
+        <p:nvSpPr>
+          <p:cNvPr id="3" name="Inhaltsplatzhalter 2"/>
+          <p:cNvSpPr>
+            <a:spLocks noGrp="1"/>
+          </p:cNvSpPr>
+          <p:nvPr>
+            <p:ph idx="1"/>
+          </p:nvPr>
+        </p:nvSpPr>
+        <p:spPr/>
+        <p:txBody>
+          <a:bodyPr/>
+          <a:lstStyle/>
+          <a:p>
+            <a:endParaRPr lang="de-DE" dirty="0" smtClean="0"/>
+          </a:p>
+          <a:p>
+            <a:endParaRPr lang="de-DE" dirty="0"/>
+          </a:p>
+        </p:txBody>
+      </p:sp>
+      <p:sp>
+        <p:nvSpPr>
+          <p:cNvPr id="4" name="Datumsplatzhalter 3"/>
+          <p:cNvSpPr>
+            <a:spLocks noGrp="1"/>
+          </p:cNvSpPr>
+          <p:nvPr>
+            <p:ph type="dt" sz="half" idx="10"/>
+          </p:nvPr>
+        </p:nvSpPr>
+        <p:spPr/>
+        <p:txBody>
+          <a:bodyPr/>
+          <a:lstStyle/>
+          <a:p>
+            <a:fld id="{048220EE-0B5D-1D4F-A698-CD85F79D8F31}" type="datetime1">
+              <a:rPr lang="de-CH" smtClean="0"/>
+              <a:t>19.07.12</a:t>
+            </a:fld>
+            <a:endParaRPr lang="de-DE"/>
+          </a:p>
+        </p:txBody>
+      </p:sp>
+      <p:sp>
+        <p:nvSpPr>
+          <p:cNvPr id="5" name="Fußzeilenplatzhalter 4"/>
+          <p:cNvSpPr>
+            <a:spLocks noGrp="1"/>
+          </p:cNvSpPr>
+          <p:nvPr>
+            <p:ph type="ftr" sz="quarter" idx="11"/>
+          </p:nvPr>
+        </p:nvSpPr>
+        <p:spPr/>
+        <p:txBody>
+          <a:bodyPr/>
+          <a:lstStyle/>
+          <a:p>
+            <a:r>
+              <a:rPr lang="de-DE" smtClean="0"/>
+              <a:t>Group 4</a:t>
+            </a:r>
+            <a:endParaRPr lang="de-DE"/>
+          </a:p>
+        </p:txBody>
+      </p:sp>
+      <p:sp>
+        <p:nvSpPr>
+          <p:cNvPr id="6" name="Foliennummernplatzhalter 5"/>
+          <p:cNvSpPr>
+            <a:spLocks noGrp="1"/>
+          </p:cNvSpPr>
+          <p:nvPr>
+            <p:ph type="sldNum" sz="quarter" idx="12"/>
+          </p:nvPr>
+        </p:nvSpPr>
+        <p:spPr/>
+        <p:txBody>
+          <a:bodyPr/>
+          <a:lstStyle/>
+          <a:p>
+            <a:fld id="{54C3B571-D783-E845-AA51-C7B99A40CE52}" type="slidenum">
+              <a:rPr lang="de-DE" smtClean="0"/>
+              <a:t>3</a:t>
+            </a:fld>
+            <a:endParaRPr lang="de-DE"/>
+          </a:p>
+        </p:txBody>
+      </p:sp>
+      <p:pic>
+        <p:nvPicPr>
+          <p:cNvPr id="8" name="Bild 7" descr="Foto.JPG"/>
+          <p:cNvPicPr>
+            <a:picLocks noChangeAspect="1"/>
+          </p:cNvPicPr>
+          <p:nvPr/>
+        </p:nvPicPr>
+        <p:blipFill>
+          <a:blip r:embed="rId2">
+            <a:extLst>
+              <a:ext uri="{28A0092B-C50C-407E-A947-70E740481C1C}">
+                <a14:useLocalDpi xmlns:a14="http://schemas.microsoft.com/office/drawing/2010/main" val="0"/>
+              </a:ext>
+            </a:extLst>
+          </a:blip>
+          <a:stretch>
+            <a:fillRect/>
+          </a:stretch>
+        </p:blipFill>
+        <p:spPr>
+          <a:xfrm rot="5400000">
+            <a:off x="2095936" y="1907159"/>
+            <a:ext cx="4952075" cy="3698772"/>
+          </a:xfrm>
+          <a:prstGeom prst="rect">
+            <a:avLst/>
+          </a:prstGeom>
+        </p:spPr>
+      </p:pic>
+    </p:spTree>
+    <p:extLst>
+      <p:ext uri="{BB962C8B-B14F-4D97-AF65-F5344CB8AC3E}">
+        <p14:creationId xmlns:p14="http://schemas.microsoft.com/office/powerpoint/2010/main" val="866056116"/>
+      </p:ext>
+    </p:extLst>
+  </p:cSld>
+  <p:clrMapOvr>
+    <a:masterClrMapping/>
+  </p:clrMapOvr>
+  <p:timing>
+    <p:tnLst>
+      <p:par>
+        <p:cTn xmlns:p14="http://schemas.microsoft.com/office/powerpoint/2010/main" id="1" dur="indefinite" restart="never" nodeType="tmRoot"/>
+      </p:par>
+    </p:tnLst>
+  </p:timing>
+</p:sld>
+</file>
+
+<file path=ppt/slides/slide4.xml><?xml version="1.0" encoding="utf-8"?>
+<p:sld xmlns:a="http://schemas.openxmlformats.org/drawingml/2006/main" xmlns:r="http://schemas.openxmlformats.org/officeDocument/2006/relationships" xmlns:p="http://schemas.openxmlformats.org/presentationml/2006/main">
+  <p:cSld>
+    <p:spTree>
+      <p:nvGrpSpPr>
+        <p:cNvPr id="1" name=""/>
+        <p:cNvGrpSpPr/>
+        <p:nvPr/>
+      </p:nvGrpSpPr>
+      <p:grpSpPr>
+        <a:xfrm>
+          <a:off x="0" y="0"/>
+          <a:ext cx="0" cy="0"/>
+          <a:chOff x="0" y="0"/>
+          <a:chExt cx="0" cy="0"/>
+        </a:xfrm>
+      </p:grpSpPr>
+      <p:sp>
+        <p:nvSpPr>
+          <p:cNvPr id="2" name="Titel 1"/>
+          <p:cNvSpPr>
+            <a:spLocks noGrp="1"/>
+          </p:cNvSpPr>
+          <p:nvPr>
+            <p:ph type="title"/>
+          </p:nvPr>
+        </p:nvSpPr>
+        <p:spPr/>
+        <p:txBody>
+          <a:bodyPr/>
+          <a:lstStyle/>
+          <a:p>
+            <a:r>
+              <a:rPr lang="de-DE" dirty="0" smtClean="0"/>
+              <a:t>Piano roll </a:t>
+            </a:r>
+            <a:r>
+              <a:rPr lang="de-DE" dirty="0" err="1" smtClean="0"/>
+              <a:t>scanner</a:t>
+            </a:r>
+            <a:endParaRPr lang="de-DE" dirty="0"/>
+          </a:p>
+        </p:txBody>
+      </p:sp>
+      <p:sp>
+        <p:nvSpPr>
+          <p:cNvPr id="4" name="Datumsplatzhalter 3"/>
+          <p:cNvSpPr>
+            <a:spLocks noGrp="1"/>
+          </p:cNvSpPr>
+          <p:nvPr>
+            <p:ph type="dt" sz="half" idx="10"/>
+          </p:nvPr>
+        </p:nvSpPr>
+        <p:spPr/>
+        <p:txBody>
+          <a:bodyPr/>
+          <a:lstStyle/>
+          <a:p>
+            <a:fld id="{048220EE-0B5D-1D4F-A698-CD85F79D8F31}" type="datetime1">
+              <a:rPr lang="de-CH" smtClean="0"/>
+              <a:t>19.07.12</a:t>
+            </a:fld>
+            <a:endParaRPr lang="de-DE"/>
+          </a:p>
+        </p:txBody>
+      </p:sp>
+      <p:sp>
+        <p:nvSpPr>
+          <p:cNvPr id="5" name="Fußzeilenplatzhalter 4"/>
+          <p:cNvSpPr>
+            <a:spLocks noGrp="1"/>
+          </p:cNvSpPr>
+          <p:nvPr>
+            <p:ph type="ftr" sz="quarter" idx="11"/>
+          </p:nvPr>
+        </p:nvSpPr>
+        <p:spPr/>
+        <p:txBody>
+          <a:bodyPr/>
+          <a:lstStyle/>
+          <a:p>
+            <a:r>
+              <a:rPr lang="de-DE" smtClean="0"/>
+              <a:t>Group 4</a:t>
+            </a:r>
+            <a:endParaRPr lang="de-DE"/>
+          </a:p>
+        </p:txBody>
+      </p:sp>
+      <p:sp>
+        <p:nvSpPr>
+          <p:cNvPr id="6" name="Foliennummernplatzhalter 5"/>
+          <p:cNvSpPr>
+            <a:spLocks noGrp="1"/>
+          </p:cNvSpPr>
+          <p:nvPr>
+            <p:ph type="sldNum" sz="quarter" idx="12"/>
+          </p:nvPr>
+        </p:nvSpPr>
+        <p:spPr/>
+        <p:txBody>
+          <a:bodyPr/>
+          <a:lstStyle/>
+          <a:p>
+            <a:fld id="{54C3B571-D783-E845-AA51-C7B99A40CE52}" type="slidenum">
+              <a:rPr lang="de-DE" smtClean="0"/>
+              <a:t>4</a:t>
+            </a:fld>
+            <a:endParaRPr lang="de-DE"/>
+          </a:p>
+        </p:txBody>
+      </p:sp>
+      <p:pic>
+        <p:nvPicPr>
+          <p:cNvPr id="9" name="Inhaltsplatzhalter 8" descr="scanner fertig-36pt.png"/>
+          <p:cNvPicPr>
+            <a:picLocks noGrp="1" noChangeAspect="1"/>
+          </p:cNvPicPr>
+          <p:nvPr>
+            <p:ph idx="1"/>
+          </p:nvPr>
+        </p:nvPicPr>
+        <p:blipFill>
+          <a:blip r:embed="rId2">
+            <a:extLst>
+              <a:ext uri="{28A0092B-C50C-407E-A947-70E740481C1C}">
+                <a14:useLocalDpi xmlns:a14="http://schemas.microsoft.com/office/drawing/2010/main" val="0"/>
+              </a:ext>
+            </a:extLst>
+          </a:blip>
+          <a:srcRect t="3670" b="3670"/>
+          <a:stretch>
+            <a:fillRect/>
+          </a:stretch>
+        </p:blipFill>
+        <p:spPr/>
+      </p:pic>
+    </p:spTree>
+    <p:extLst>
+      <p:ext uri="{BB962C8B-B14F-4D97-AF65-F5344CB8AC3E}">
+        <p14:creationId xmlns:p14="http://schemas.microsoft.com/office/powerpoint/2010/main" val="3032409290"/>
+      </p:ext>
+    </p:extLst>
+  </p:cSld>
+  <p:clrMapOvr>
+    <a:masterClrMapping/>
+  </p:clrMapOvr>
+  <p:timing>
+    <p:tnLst>
+      <p:par>
+        <p:cTn xmlns:p14="http://schemas.microsoft.com/office/powerpoint/2010/main" id="1" dur="indefinite" restart="never" nodeType="tmRoot"/>
+      </p:par>
+    </p:tnLst>
+  </p:timing>
+</p:sld>
+</file>
+
+<file path=ppt/slides/slide5.xml><?xml version="1.0" encoding="utf-8"?>
+<p:sld xmlns:a="http://schemas.openxmlformats.org/drawingml/2006/main" xmlns:r="http://schemas.openxmlformats.org/officeDocument/2006/relationships" xmlns:p="http://schemas.openxmlformats.org/presentationml/2006/main">
+  <p:cSld>
+    <p:spTree>
+      <p:nvGrpSpPr>
+        <p:cNvPr id="1" name=""/>
+        <p:cNvGrpSpPr/>
+        <p:nvPr/>
+      </p:nvGrpSpPr>
+      <p:grpSpPr>
+        <a:xfrm>
+          <a:off x="0" y="0"/>
+          <a:ext cx="0" cy="0"/>
+          <a:chOff x="0" y="0"/>
+          <a:chExt cx="0" cy="0"/>
+        </a:xfrm>
+      </p:grpSpPr>
+      <p:sp>
+        <p:nvSpPr>
+          <p:cNvPr id="2" name="Titel 1"/>
+          <p:cNvSpPr>
+            <a:spLocks noGrp="1"/>
+          </p:cNvSpPr>
+          <p:nvPr>
+            <p:ph type="title"/>
+          </p:nvPr>
+        </p:nvSpPr>
+        <p:spPr/>
+        <p:txBody>
+          <a:bodyPr/>
+          <a:lstStyle/>
+          <a:p>
+            <a:r>
+              <a:rPr lang="de-DE" dirty="0" smtClean="0"/>
+              <a:t>Piano roll </a:t>
+            </a:r>
+            <a:r>
+              <a:rPr lang="de-DE" dirty="0" err="1" smtClean="0"/>
+              <a:t>scanner</a:t>
+            </a:r>
+            <a:endParaRPr lang="de-DE" dirty="0"/>
+          </a:p>
+        </p:txBody>
+      </p:sp>
+      <p:sp>
+        <p:nvSpPr>
+          <p:cNvPr id="4" name="Datumsplatzhalter 3"/>
+          <p:cNvSpPr>
+            <a:spLocks noGrp="1"/>
+          </p:cNvSpPr>
+          <p:nvPr>
+            <p:ph type="dt" sz="half" idx="10"/>
+          </p:nvPr>
+        </p:nvSpPr>
+        <p:spPr/>
+        <p:txBody>
+          <a:bodyPr/>
+          <a:lstStyle/>
+          <a:p>
+            <a:fld id="{048220EE-0B5D-1D4F-A698-CD85F79D8F31}" type="datetime1">
+              <a:rPr lang="de-CH" smtClean="0"/>
+              <a:t>20.07.12</a:t>
+            </a:fld>
+            <a:endParaRPr lang="de-DE"/>
+          </a:p>
+        </p:txBody>
+      </p:sp>
+      <p:sp>
+        <p:nvSpPr>
+          <p:cNvPr id="5" name="Fußzeilenplatzhalter 4"/>
+          <p:cNvSpPr>
+            <a:spLocks noGrp="1"/>
+          </p:cNvSpPr>
+          <p:nvPr>
+            <p:ph type="ftr" sz="quarter" idx="11"/>
+          </p:nvPr>
+        </p:nvSpPr>
+        <p:spPr/>
+        <p:txBody>
+          <a:bodyPr/>
+          <a:lstStyle/>
+          <a:p>
+            <a:r>
+              <a:rPr lang="de-DE" smtClean="0"/>
+              <a:t>Group 4</a:t>
+            </a:r>
+            <a:endParaRPr lang="de-DE"/>
+          </a:p>
+        </p:txBody>
+      </p:sp>
+      <p:sp>
+        <p:nvSpPr>
+          <p:cNvPr id="6" name="Foliennummernplatzhalter 5"/>
+          <p:cNvSpPr>
+            <a:spLocks noGrp="1"/>
+          </p:cNvSpPr>
+          <p:nvPr>
+            <p:ph type="sldNum" sz="quarter" idx="12"/>
+          </p:nvPr>
+        </p:nvSpPr>
+        <p:spPr/>
+        <p:txBody>
+          <a:bodyPr/>
+          <a:lstStyle/>
+          <a:p>
+            <a:fld id="{54C3B571-D783-E845-AA51-C7B99A40CE52}" type="slidenum">
+              <a:rPr lang="de-DE" smtClean="0"/>
+              <a:t>5</a:t>
+            </a:fld>
+            <a:endParaRPr lang="de-DE"/>
+          </a:p>
+        </p:txBody>
+      </p:sp>
+      <p:pic>
+        <p:nvPicPr>
+          <p:cNvPr id="7" name="Bild 6" descr="roll holder complet.png"/>
+          <p:cNvPicPr>
+            <a:picLocks noChangeAspect="1"/>
+          </p:cNvPicPr>
+          <p:nvPr/>
+        </p:nvPicPr>
+        <p:blipFill>
+          <a:blip r:embed="rId2">
+            <a:extLst>
+              <a:ext uri="{28A0092B-C50C-407E-A947-70E740481C1C}">
+                <a14:useLocalDpi xmlns:a14="http://schemas.microsoft.com/office/drawing/2010/main" val="0"/>
+              </a:ext>
+            </a:extLst>
+          </a:blip>
+          <a:stretch>
+            <a:fillRect/>
+          </a:stretch>
+        </p:blipFill>
+        <p:spPr>
+          <a:xfrm>
+            <a:off x="1646686" y="1605027"/>
+            <a:ext cx="6129725" cy="3673065"/>
+          </a:xfrm>
+          <a:prstGeom prst="rect">
+            <a:avLst/>
+          </a:prstGeom>
+        </p:spPr>
+      </p:pic>
+    </p:spTree>
+    <p:extLst>
+      <p:ext uri="{BB962C8B-B14F-4D97-AF65-F5344CB8AC3E}">
+        <p14:creationId xmlns:p14="http://schemas.microsoft.com/office/powerpoint/2010/main" val="1233925469"/>
+      </p:ext>
+    </p:extLst>
+  </p:cSld>
+  <p:clrMapOvr>
+    <a:masterClrMapping/>
+  </p:clrMapOvr>
+  <p:timing>
+    <p:tnLst>
+      <p:par>
+        <p:cTn xmlns:p14="http://schemas.microsoft.com/office/powerpoint/2010/main" id="1" dur="indefinite" restart="never" nodeType="tmRoot"/>
+      </p:par>
+    </p:tnLst>
+  </p:timing>
+</p:sld>
+</file>
+
+<file path=ppt/slides/slide6.xml><?xml version="1.0" encoding="utf-8"?>
+<p:sld xmlns:a="http://schemas.openxmlformats.org/drawingml/2006/main" xmlns:r="http://schemas.openxmlformats.org/officeDocument/2006/relationships" xmlns:p="http://schemas.openxmlformats.org/presentationml/2006/main">
+  <p:cSld>
+    <p:spTree>
+      <p:nvGrpSpPr>
+        <p:cNvPr id="1" name=""/>
+        <p:cNvGrpSpPr/>
+        <p:nvPr/>
+      </p:nvGrpSpPr>
+      <p:grpSpPr>
+        <a:xfrm>
+          <a:off x="0" y="0"/>
+          <a:ext cx="0" cy="0"/>
+          <a:chOff x="0" y="0"/>
+          <a:chExt cx="0" cy="0"/>
+        </a:xfrm>
+      </p:grpSpPr>
+      <p:sp>
+        <p:nvSpPr>
+          <p:cNvPr id="2" name="Titel 1"/>
+          <p:cNvSpPr>
+            <a:spLocks noGrp="1"/>
+          </p:cNvSpPr>
+          <p:nvPr>
+            <p:ph type="title"/>
+          </p:nvPr>
+        </p:nvSpPr>
+        <p:spPr/>
+        <p:txBody>
+          <a:bodyPr>
+            <a:normAutofit/>
+          </a:bodyPr>
+          <a:lstStyle/>
+          <a:p>
+            <a:r>
+              <a:rPr lang="de-DE" dirty="0" smtClean="0"/>
+              <a:t>Piano roll </a:t>
+            </a:r>
+            <a:r>
+              <a:rPr lang="de-DE" dirty="0" err="1" smtClean="0"/>
+              <a:t>scanner</a:t>
+            </a:r>
+            <a:endParaRPr lang="de-DE" dirty="0"/>
+          </a:p>
+        </p:txBody>
+      </p:sp>
+      <p:sp>
+        <p:nvSpPr>
+          <p:cNvPr id="4" name="Datumsplatzhalter 3"/>
+          <p:cNvSpPr>
+            <a:spLocks noGrp="1"/>
+          </p:cNvSpPr>
+          <p:nvPr>
+            <p:ph type="dt" sz="half" idx="10"/>
+          </p:nvPr>
+        </p:nvSpPr>
+        <p:spPr/>
+        <p:txBody>
+          <a:bodyPr/>
+          <a:lstStyle/>
+          <a:p>
+            <a:fld id="{048220EE-0B5D-1D4F-A698-CD85F79D8F31}" type="datetime1">
+              <a:rPr lang="de-CH" smtClean="0"/>
+              <a:t>19.07.12</a:t>
+            </a:fld>
+            <a:endParaRPr lang="de-DE"/>
+          </a:p>
+        </p:txBody>
+      </p:sp>
+      <p:sp>
+        <p:nvSpPr>
+          <p:cNvPr id="5" name="Fußzeilenplatzhalter 4"/>
+          <p:cNvSpPr>
+            <a:spLocks noGrp="1"/>
+          </p:cNvSpPr>
+          <p:nvPr>
+            <p:ph type="ftr" sz="quarter" idx="11"/>
+          </p:nvPr>
+        </p:nvSpPr>
+        <p:spPr/>
+        <p:txBody>
+          <a:bodyPr/>
+          <a:lstStyle/>
+          <a:p>
+            <a:r>
+              <a:rPr lang="de-DE" smtClean="0"/>
+              <a:t>Group 4</a:t>
+            </a:r>
+            <a:endParaRPr lang="de-DE"/>
+          </a:p>
+        </p:txBody>
+      </p:sp>
+      <p:sp>
+        <p:nvSpPr>
+          <p:cNvPr id="6" name="Foliennummernplatzhalter 5"/>
+          <p:cNvSpPr>
+            <a:spLocks noGrp="1"/>
+          </p:cNvSpPr>
+          <p:nvPr>
+            <p:ph type="sldNum" sz="quarter" idx="12"/>
+          </p:nvPr>
+        </p:nvSpPr>
+        <p:spPr/>
+        <p:txBody>
+          <a:bodyPr/>
+          <a:lstStyle/>
+          <a:p>
+            <a:fld id="{54C3B571-D783-E845-AA51-C7B99A40CE52}" type="slidenum">
+              <a:rPr lang="de-DE" smtClean="0"/>
+              <a:t>6</a:t>
+            </a:fld>
+            <a:endParaRPr lang="de-DE"/>
+          </a:p>
+        </p:txBody>
+      </p:sp>
+      <p:pic>
+        <p:nvPicPr>
+          <p:cNvPr id="19" name="Bild 18" descr="explosion_holder.png"/>
+          <p:cNvPicPr>
+            <a:picLocks noChangeAspect="1"/>
+          </p:cNvPicPr>
+          <p:nvPr/>
+        </p:nvPicPr>
+        <p:blipFill>
+          <a:blip r:embed="rId2">
+            <a:extLst>
+              <a:ext uri="{28A0092B-C50C-407E-A947-70E740481C1C}">
+                <a14:useLocalDpi xmlns:a14="http://schemas.microsoft.com/office/drawing/2010/main" val="0"/>
+              </a:ext>
+            </a:extLst>
+          </a:blip>
+          <a:stretch>
+            <a:fillRect/>
+          </a:stretch>
+        </p:blipFill>
+        <p:spPr>
+          <a:xfrm>
+            <a:off x="139550" y="4311650"/>
+            <a:ext cx="8890000" cy="2044700"/>
+          </a:xfrm>
+          <a:prstGeom prst="rect">
+            <a:avLst/>
+          </a:prstGeom>
+        </p:spPr>
+      </p:pic>
+      <p:pic>
+        <p:nvPicPr>
+          <p:cNvPr id="20" name="Bild 19" descr="explosion 1 holder.png"/>
+          <p:cNvPicPr>
+            <a:picLocks noChangeAspect="1"/>
+          </p:cNvPicPr>
+          <p:nvPr/>
+        </p:nvPicPr>
+        <p:blipFill>
+          <a:blip r:embed="rId3">
+            <a:extLst>
+              <a:ext uri="{28A0092B-C50C-407E-A947-70E740481C1C}">
+                <a14:useLocalDpi xmlns:a14="http://schemas.microsoft.com/office/drawing/2010/main" val="0"/>
+              </a:ext>
+            </a:extLst>
+          </a:blip>
+          <a:stretch>
+            <a:fillRect/>
+          </a:stretch>
+        </p:blipFill>
+        <p:spPr>
+          <a:xfrm>
+            <a:off x="2665400" y="1160644"/>
+            <a:ext cx="3963893" cy="2995292"/>
+          </a:xfrm>
+          <a:prstGeom prst="rect">
+            <a:avLst/>
+          </a:prstGeom>
+        </p:spPr>
+      </p:pic>
+    </p:spTree>
+    <p:extLst>
+      <p:ext uri="{BB962C8B-B14F-4D97-AF65-F5344CB8AC3E}">
+        <p14:creationId xmlns:p14="http://schemas.microsoft.com/office/powerpoint/2010/main" val="135149535"/>
+      </p:ext>
+    </p:extLst>
+  </p:cSld>
+  <p:clrMapOvr>
+    <a:masterClrMapping/>
+  </p:clrMapOvr>
+  <p:timing>
+    <p:tnLst>
+      <p:par>
+        <p:cTn xmlns:p14="http://schemas.microsoft.com/office/powerpoint/2010/main" id="1" dur="indefinite" restart="never" nodeType="tmRoot"/>
+      </p:par>
+    </p:tnLst>
+  </p:timing>
+</p:sld>
+</file>
+
+<file path=ppt/slides/slide7.xml><?xml version="1.0" encoding="utf-8"?>
+<p:sld xmlns:a="http://schemas.openxmlformats.org/drawingml/2006/main" xmlns:r="http://schemas.openxmlformats.org/officeDocument/2006/relationships" xmlns:p="http://schemas.openxmlformats.org/presentationml/2006/main">
+  <p:cSld>
+    <p:spTree>
+      <p:nvGrpSpPr>
+        <p:cNvPr id="1" name=""/>
+        <p:cNvGrpSpPr/>
+        <p:nvPr/>
+      </p:nvGrpSpPr>
+      <p:grpSpPr>
+        <a:xfrm>
+          <a:off x="0" y="0"/>
+          <a:ext cx="0" cy="0"/>
+          <a:chOff x="0" y="0"/>
+          <a:chExt cx="0" cy="0"/>
+        </a:xfrm>
+      </p:grpSpPr>
+      <p:sp>
+        <p:nvSpPr>
+          <p:cNvPr id="2" name="Titel 1"/>
+          <p:cNvSpPr>
+            <a:spLocks noGrp="1"/>
+          </p:cNvSpPr>
+          <p:nvPr>
+            <p:ph type="title"/>
+          </p:nvPr>
+        </p:nvSpPr>
+        <p:spPr/>
+        <p:txBody>
+          <a:bodyPr/>
+          <a:lstStyle/>
+          <a:p>
+            <a:r>
+              <a:rPr lang="de-DE" dirty="0" smtClean="0"/>
+              <a:t>Piano roll </a:t>
+            </a:r>
+            <a:r>
+              <a:rPr lang="de-DE" dirty="0" err="1" smtClean="0"/>
+              <a:t>scanner</a:t>
+            </a:r>
+            <a:endParaRPr lang="de-DE" dirty="0"/>
+          </a:p>
+        </p:txBody>
+      </p:sp>
+      <p:sp>
+        <p:nvSpPr>
+          <p:cNvPr id="4" name="Datumsplatzhalter 3"/>
+          <p:cNvSpPr>
+            <a:spLocks noGrp="1"/>
+          </p:cNvSpPr>
+          <p:nvPr>
+            <p:ph type="dt" sz="half" idx="10"/>
+          </p:nvPr>
+        </p:nvSpPr>
+        <p:spPr/>
+        <p:txBody>
+          <a:bodyPr/>
+          <a:lstStyle/>
+          <a:p>
+            <a:fld id="{048220EE-0B5D-1D4F-A698-CD85F79D8F31}" type="datetime1">
+              <a:rPr lang="de-CH" smtClean="0"/>
+              <a:t>20.07.12</a:t>
+            </a:fld>
+            <a:endParaRPr lang="de-DE"/>
+          </a:p>
+        </p:txBody>
+      </p:sp>
+      <p:sp>
+        <p:nvSpPr>
+          <p:cNvPr id="5" name="Fußzeilenplatzhalter 4"/>
+          <p:cNvSpPr>
+            <a:spLocks noGrp="1"/>
+          </p:cNvSpPr>
+          <p:nvPr>
+            <p:ph type="ftr" sz="quarter" idx="11"/>
+          </p:nvPr>
+        </p:nvSpPr>
+        <p:spPr/>
+        <p:txBody>
+          <a:bodyPr/>
+          <a:lstStyle/>
+          <a:p>
+            <a:r>
+              <a:rPr lang="de-DE" smtClean="0"/>
+              <a:t>Group 4</a:t>
+            </a:r>
+            <a:endParaRPr lang="de-DE"/>
+          </a:p>
+        </p:txBody>
+      </p:sp>
+      <p:sp>
+        <p:nvSpPr>
+          <p:cNvPr id="6" name="Foliennummernplatzhalter 5"/>
+          <p:cNvSpPr>
+            <a:spLocks noGrp="1"/>
+          </p:cNvSpPr>
+          <p:nvPr>
+            <p:ph type="sldNum" sz="quarter" idx="12"/>
+          </p:nvPr>
+        </p:nvSpPr>
+        <p:spPr/>
+        <p:txBody>
+          <a:bodyPr/>
+          <a:lstStyle/>
+          <a:p>
+            <a:fld id="{54C3B571-D783-E845-AA51-C7B99A40CE52}" type="slidenum">
+              <a:rPr lang="de-DE" smtClean="0"/>
+              <a:t>7</a:t>
+            </a:fld>
+            <a:endParaRPr lang="de-DE"/>
+          </a:p>
+        </p:txBody>
+      </p:sp>
+      <p:pic>
+        <p:nvPicPr>
+          <p:cNvPr id="9" name="Inhaltsplatzhalter 8" descr="scanner fertig-36pt.png"/>
+          <p:cNvPicPr>
+            <a:picLocks noGrp="1" noChangeAspect="1"/>
+          </p:cNvPicPr>
+          <p:nvPr>
+            <p:ph idx="1"/>
+          </p:nvPr>
+        </p:nvPicPr>
+        <p:blipFill>
+          <a:blip r:embed="rId2">
+            <a:extLst>
+              <a:ext uri="{28A0092B-C50C-407E-A947-70E740481C1C}">
+                <a14:useLocalDpi xmlns:a14="http://schemas.microsoft.com/office/drawing/2010/main" val="0"/>
+              </a:ext>
+            </a:extLst>
+          </a:blip>
+          <a:srcRect t="3670" b="3670"/>
+          <a:stretch>
+            <a:fillRect/>
+          </a:stretch>
+        </p:blipFill>
+        <p:spPr/>
+      </p:pic>
+    </p:spTree>
+    <p:extLst>
+      <p:ext uri="{BB962C8B-B14F-4D97-AF65-F5344CB8AC3E}">
+        <p14:creationId xmlns:p14="http://schemas.microsoft.com/office/powerpoint/2010/main" val="3675649034"/>
+      </p:ext>
+    </p:extLst>
+  </p:cSld>
+  <p:clrMapOvr>
+    <a:masterClrMapping/>
+  </p:clrMapOvr>
+  <p:timing>
+    <p:tnLst>
+      <p:par>
+        <p:cTn xmlns:p14="http://schemas.microsoft.com/office/powerpoint/2010/main" id="1" dur="indefinite" restart="never" nodeType="tmRoot"/>
+      </p:par>
+    </p:tnLst>
+  </p:timing>
+</p:sld>
+</file>
+
+<file path=ppt/slides/slide8.xml><?xml version="1.0" encoding="utf-8"?>
+<p:sld xmlns:a="http://schemas.openxmlformats.org/drawingml/2006/main" xmlns:r="http://schemas.openxmlformats.org/officeDocument/2006/relationships" xmlns:p="http://schemas.openxmlformats.org/presentationml/2006/main">
+  <p:cSld>
+    <p:spTree>
+      <p:nvGrpSpPr>
+        <p:cNvPr id="1" name=""/>
+        <p:cNvGrpSpPr/>
+        <p:nvPr/>
+      </p:nvGrpSpPr>
+      <p:grpSpPr>
+        <a:xfrm>
+          <a:off x="0" y="0"/>
+          <a:ext cx="0" cy="0"/>
+          <a:chOff x="0" y="0"/>
+          <a:chExt cx="0" cy="0"/>
+        </a:xfrm>
+      </p:grpSpPr>
+      <p:sp>
+        <p:nvSpPr>
+          <p:cNvPr id="2" name="Titel 1"/>
+          <p:cNvSpPr>
+            <a:spLocks noGrp="1"/>
+          </p:cNvSpPr>
+          <p:nvPr>
+            <p:ph type="title"/>
+          </p:nvPr>
+        </p:nvSpPr>
+        <p:spPr/>
+        <p:txBody>
+          <a:bodyPr/>
+          <a:lstStyle/>
+          <a:p>
+            <a:r>
+              <a:rPr lang="de-DE" dirty="0" smtClean="0"/>
+              <a:t>Piano roll </a:t>
+            </a:r>
+            <a:r>
+              <a:rPr lang="de-DE" dirty="0" err="1" smtClean="0"/>
+              <a:t>scanner</a:t>
+            </a:r>
+            <a:endParaRPr lang="de-DE" dirty="0"/>
+          </a:p>
+        </p:txBody>
+      </p:sp>
+      <p:sp>
+        <p:nvSpPr>
+          <p:cNvPr id="4" name="Datumsplatzhalter 3"/>
+          <p:cNvSpPr>
+            <a:spLocks noGrp="1"/>
+          </p:cNvSpPr>
+          <p:nvPr>
+            <p:ph type="dt" sz="half" idx="10"/>
+          </p:nvPr>
+        </p:nvSpPr>
+        <p:spPr/>
+        <p:txBody>
+          <a:bodyPr/>
+          <a:lstStyle/>
+          <a:p>
+            <a:fld id="{048220EE-0B5D-1D4F-A698-CD85F79D8F31}" type="datetime1">
+              <a:rPr lang="de-CH" smtClean="0"/>
+              <a:t>19.07.12</a:t>
+            </a:fld>
+            <a:endParaRPr lang="de-DE"/>
+          </a:p>
+        </p:txBody>
+      </p:sp>
+      <p:sp>
+        <p:nvSpPr>
+          <p:cNvPr id="5" name="Fußzeilenplatzhalter 4"/>
+          <p:cNvSpPr>
+            <a:spLocks noGrp="1"/>
+          </p:cNvSpPr>
+          <p:nvPr>
+            <p:ph type="ftr" sz="quarter" idx="11"/>
+          </p:nvPr>
+        </p:nvSpPr>
+        <p:spPr/>
+        <p:txBody>
+          <a:bodyPr/>
+          <a:lstStyle/>
+          <a:p>
+            <a:r>
+              <a:rPr lang="de-DE" smtClean="0"/>
+              <a:t>Group 4</a:t>
+            </a:r>
+            <a:endParaRPr lang="de-DE"/>
+          </a:p>
+        </p:txBody>
+      </p:sp>
+      <p:sp>
+        <p:nvSpPr>
+          <p:cNvPr id="6" name="Foliennummernplatzhalter 5"/>
+          <p:cNvSpPr>
+            <a:spLocks noGrp="1"/>
+          </p:cNvSpPr>
+          <p:nvPr>
+            <p:ph type="sldNum" sz="quarter" idx="12"/>
+          </p:nvPr>
+        </p:nvSpPr>
+        <p:spPr/>
+        <p:txBody>
+          <a:bodyPr/>
+          <a:lstStyle/>
+          <a:p>
+            <a:fld id="{54C3B571-D783-E845-AA51-C7B99A40CE52}" type="slidenum">
+              <a:rPr lang="de-DE" smtClean="0"/>
+              <a:t>8</a:t>
+            </a:fld>
+            <a:endParaRPr lang="de-DE"/>
+          </a:p>
+        </p:txBody>
+      </p:sp>
+      <p:pic>
+        <p:nvPicPr>
+          <p:cNvPr id="7" name="Bild 6" descr="transport.png"/>
+          <p:cNvPicPr>
+            <a:picLocks noChangeAspect="1"/>
+          </p:cNvPicPr>
+          <p:nvPr/>
+        </p:nvPicPr>
+        <p:blipFill>
+          <a:blip r:embed="rId2">
+            <a:extLst>
+              <a:ext uri="{28A0092B-C50C-407E-A947-70E740481C1C}">
+                <a14:useLocalDpi xmlns:a14="http://schemas.microsoft.com/office/drawing/2010/main" val="0"/>
+              </a:ext>
+            </a:extLst>
+          </a:blip>
+          <a:stretch>
+            <a:fillRect/>
+          </a:stretch>
+        </p:blipFill>
+        <p:spPr>
+          <a:xfrm>
+            <a:off x="2395430" y="1452296"/>
+            <a:ext cx="4719523" cy="4904054"/>
+          </a:xfrm>
+          <a:prstGeom prst="rect">
+            <a:avLst/>
+          </a:prstGeom>
+        </p:spPr>
+      </p:pic>
+    </p:spTree>
+    <p:extLst>
+      <p:ext uri="{BB962C8B-B14F-4D97-AF65-F5344CB8AC3E}">
+        <p14:creationId xmlns:p14="http://schemas.microsoft.com/office/powerpoint/2010/main" val="1354710345"/>
       </p:ext>
     </p:extLst>
   </p:cSld>
@@ -5894,11 +7379,11 @@
           <a:p>
             <a:r>
               <a:rPr lang="de-DE" dirty="0" smtClean="0"/>
-              <a:t>Data </a:t>
+              <a:t>Piano roll </a:t>
             </a:r>
             <a:r>
               <a:rPr lang="de-DE" dirty="0" err="1" smtClean="0"/>
-              <a:t>processing</a:t>
+              <a:t>scanner</a:t>
             </a:r>
             <a:endParaRPr lang="de-DE" dirty="0"/>
           </a:p>
@@ -5921,7 +7406,7 @@
           <a:p>
             <a:fld id="{048220EE-0B5D-1D4F-A698-CD85F79D8F31}" type="datetime1">
               <a:rPr lang="de-CH" smtClean="0"/>
-              <a:t>19.07.12</a:t>
+              <a:t>20.07.12</a:t>
             </a:fld>
             <a:endParaRPr lang="de-DE"/>
           </a:p>
@@ -5973,87 +7458,35 @@
           </a:p>
         </p:txBody>
       </p:sp>
-      <p:sp>
-        <p:nvSpPr>
-          <p:cNvPr id="8" name="Inhaltsplatzhalter 7"/>
-          <p:cNvSpPr>
-            <a:spLocks noGrp="1"/>
-          </p:cNvSpPr>
+      <p:pic>
+        <p:nvPicPr>
+          <p:cNvPr id="9" name="Inhaltsplatzhalter 8" descr="scanner fertig-36pt.png"/>
+          <p:cNvPicPr>
+            <a:picLocks noGrp="1" noChangeAspect="1"/>
+          </p:cNvPicPr>
           <p:nvPr>
             <p:ph idx="1"/>
           </p:nvPr>
-        </p:nvSpPr>
-        <p:spPr/>
-        <p:txBody>
-          <a:bodyPr/>
-          <a:lstStyle/>
-          <a:p>
-            <a:r>
-              <a:rPr lang="de-DE" dirty="0" smtClean="0"/>
-              <a:t>Central </a:t>
-            </a:r>
-            <a:r>
-              <a:rPr lang="de-DE" dirty="0" err="1" smtClean="0"/>
-              <a:t>moment</a:t>
-            </a:r>
-            <a:r>
-              <a:rPr lang="de-DE" dirty="0" smtClean="0"/>
-              <a:t> </a:t>
-            </a:r>
-            <a:r>
-              <a:rPr lang="de-DE" dirty="0" err="1" smtClean="0"/>
-              <a:t>calculation</a:t>
-            </a:r>
-            <a:endParaRPr lang="de-DE" dirty="0" smtClean="0"/>
-          </a:p>
-          <a:p>
-            <a:r>
-              <a:rPr lang="de-DE" dirty="0" err="1" smtClean="0"/>
-              <a:t>Connected</a:t>
-            </a:r>
-            <a:r>
-              <a:rPr lang="de-DE" dirty="0" smtClean="0"/>
-              <a:t> </a:t>
-            </a:r>
-            <a:r>
-              <a:rPr lang="de-DE" dirty="0" err="1" smtClean="0"/>
-              <a:t>component</a:t>
-            </a:r>
-            <a:r>
-              <a:rPr lang="de-DE" dirty="0" smtClean="0"/>
-              <a:t> </a:t>
-            </a:r>
-            <a:r>
-              <a:rPr lang="de-DE" dirty="0" err="1" smtClean="0"/>
-              <a:t>labeling</a:t>
-            </a:r>
-            <a:endParaRPr lang="de-DE" dirty="0" smtClean="0"/>
-          </a:p>
-          <a:p>
-            <a:r>
-              <a:rPr lang="de-DE" dirty="0" smtClean="0"/>
-              <a:t>Template </a:t>
-            </a:r>
-            <a:r>
-              <a:rPr lang="de-DE" dirty="0" err="1" smtClean="0"/>
-              <a:t>matching</a:t>
-            </a:r>
-            <a:r>
-              <a:rPr lang="de-DE" dirty="0" smtClean="0"/>
-              <a:t> </a:t>
-            </a:r>
-            <a:r>
-              <a:rPr lang="de-DE" dirty="0" err="1" smtClean="0"/>
-              <a:t>algorithm</a:t>
-            </a:r>
-            <a:endParaRPr lang="de-DE" dirty="0"/>
-          </a:p>
-        </p:txBody>
-      </p:sp>
+        </p:nvPicPr>
+        <p:blipFill>
+          <a:blip r:embed="rId2">
+            <a:extLst>
+              <a:ext uri="{28A0092B-C50C-407E-A947-70E740481C1C}">
+                <a14:useLocalDpi xmlns:a14="http://schemas.microsoft.com/office/drawing/2010/main" val="0"/>
+              </a:ext>
+            </a:extLst>
+          </a:blip>
+          <a:srcRect t="3670" b="3670"/>
+          <a:stretch>
+            <a:fillRect/>
+          </a:stretch>
+        </p:blipFill>
+        <p:spPr/>
+      </p:pic>
     </p:spTree>
     <p:extLst>
       <p:ext uri="{BB962C8B-B14F-4D97-AF65-F5344CB8AC3E}">
-        <p14:creationId xmlns:p14="http://schemas.microsoft.com/office/powerpoint/2010/main" val="1817420570"/>
+        <p14:creationId xmlns:p14="http://schemas.microsoft.com/office/powerpoint/2010/main" val="3675649034"/>
       </p:ext>
     </p:extLst>
   </p:cSld>

</xml_diff>